<commit_message>
update the introduction document.
</commit_message>
<xml_diff>
--- a/doc/User_Action_Emulator_Design_Doc.pptx
+++ b/doc/User_Action_Emulator_Design_Doc.pptx
@@ -5,13 +5,17 @@
     <p:sldMasterId id="2147483648" r:id="rId1"/>
   </p:sldMasterIdLst>
   <p:notesMasterIdLst>
-    <p:notesMasterId r:id="rId6"/>
+    <p:notesMasterId r:id="rId10"/>
   </p:notesMasterIdLst>
   <p:sldIdLst>
     <p:sldId id="256" r:id="rId2"/>
-    <p:sldId id="257" r:id="rId3"/>
-    <p:sldId id="258" r:id="rId4"/>
-    <p:sldId id="259" r:id="rId5"/>
+    <p:sldId id="263" r:id="rId3"/>
+    <p:sldId id="262" r:id="rId4"/>
+    <p:sldId id="300" r:id="rId5"/>
+    <p:sldId id="301" r:id="rId6"/>
+    <p:sldId id="257" r:id="rId7"/>
+    <p:sldId id="258" r:id="rId8"/>
+    <p:sldId id="259" r:id="rId9"/>
   </p:sldIdLst>
   <p:sldSz cx="12192000" cy="6858000"/>
   <p:notesSz cx="6858000" cy="9144000"/>
@@ -200,7 +204,7 @@
           <a:p>
             <a:fld id="{2BA6DB02-48BF-406A-9449-0BBAAE1D3FCC}" type="datetimeFigureOut">
               <a:rPr lang="en-SG" smtClean="0"/>
-              <a:t>4/1/2023</a:t>
+              <a:t>31/1/2023</a:t>
             </a:fld>
             <a:endParaRPr lang="en-SG" dirty="0"/>
           </a:p>
@@ -542,6 +546,90 @@
     </p:spTree>
     <p:extLst>
       <p:ext uri="{BB962C8B-B14F-4D97-AF65-F5344CB8AC3E}">
+        <p14:creationId xmlns:p14="http://schemas.microsoft.com/office/powerpoint/2010/main" val="4249955046"/>
+      </p:ext>
+    </p:extLst>
+  </p:cSld>
+  <p:clrMapOvr>
+    <a:masterClrMapping/>
+  </p:clrMapOvr>
+</p:notes>
+</file>
+
+<file path=ppt/notesSlides/notesSlide2.xml><?xml version="1.0" encoding="utf-8"?>
+<p:notes xmlns:a="http://schemas.openxmlformats.org/drawingml/2006/main" xmlns:r="http://schemas.openxmlformats.org/officeDocument/2006/relationships" xmlns:p="http://schemas.openxmlformats.org/presentationml/2006/main">
+  <p:cSld>
+    <p:spTree>
+      <p:nvGrpSpPr>
+        <p:cNvPr id="1" name=""/>
+        <p:cNvGrpSpPr/>
+        <p:nvPr/>
+      </p:nvGrpSpPr>
+      <p:grpSpPr>
+        <a:xfrm>
+          <a:off x="0" y="0"/>
+          <a:ext cx="0" cy="0"/>
+          <a:chOff x="0" y="0"/>
+          <a:chExt cx="0" cy="0"/>
+        </a:xfrm>
+      </p:grpSpPr>
+      <p:sp>
+        <p:nvSpPr>
+          <p:cNvPr id="2" name="Slide Image Placeholder 1"/>
+          <p:cNvSpPr>
+            <a:spLocks noGrp="1" noRot="1" noChangeAspect="1"/>
+          </p:cNvSpPr>
+          <p:nvPr>
+            <p:ph type="sldImg"/>
+          </p:nvPr>
+        </p:nvSpPr>
+        <p:spPr/>
+      </p:sp>
+      <p:sp>
+        <p:nvSpPr>
+          <p:cNvPr id="3" name="Notes Placeholder 2"/>
+          <p:cNvSpPr>
+            <a:spLocks noGrp="1"/>
+          </p:cNvSpPr>
+          <p:nvPr>
+            <p:ph type="body" idx="1"/>
+          </p:nvPr>
+        </p:nvSpPr>
+        <p:spPr/>
+        <p:txBody>
+          <a:bodyPr/>
+          <a:lstStyle/>
+          <a:p>
+            <a:endParaRPr lang="en-SG" dirty="0"/>
+          </a:p>
+        </p:txBody>
+      </p:sp>
+      <p:sp>
+        <p:nvSpPr>
+          <p:cNvPr id="4" name="Slide Number Placeholder 3"/>
+          <p:cNvSpPr>
+            <a:spLocks noGrp="1"/>
+          </p:cNvSpPr>
+          <p:nvPr>
+            <p:ph type="sldNum" sz="quarter" idx="5"/>
+          </p:nvPr>
+        </p:nvSpPr>
+        <p:spPr/>
+        <p:txBody>
+          <a:bodyPr/>
+          <a:lstStyle/>
+          <a:p>
+            <a:fld id="{3B0C630E-0CE8-4915-8E08-22247CA7F11A}" type="slidenum">
+              <a:rPr lang="en-SG" smtClean="0"/>
+              <a:t>7</a:t>
+            </a:fld>
+            <a:endParaRPr lang="en-SG" dirty="0"/>
+          </a:p>
+        </p:txBody>
+      </p:sp>
+    </p:spTree>
+    <p:extLst>
+      <p:ext uri="{BB962C8B-B14F-4D97-AF65-F5344CB8AC3E}">
         <p14:creationId xmlns:p14="http://schemas.microsoft.com/office/powerpoint/2010/main" val="2765088347"/>
       </p:ext>
     </p:extLst>
@@ -701,7 +789,7 @@
           <a:p>
             <a:fld id="{568D23B1-6EF9-4DFF-A006-F22E70A73051}" type="datetimeFigureOut">
               <a:rPr lang="en-SG" smtClean="0"/>
-              <a:t>4/1/2023</a:t>
+              <a:t>31/1/2023</a:t>
             </a:fld>
             <a:endParaRPr lang="en-SG" dirty="0"/>
           </a:p>
@@ -901,7 +989,7 @@
           <a:p>
             <a:fld id="{568D23B1-6EF9-4DFF-A006-F22E70A73051}" type="datetimeFigureOut">
               <a:rPr lang="en-SG" smtClean="0"/>
-              <a:t>4/1/2023</a:t>
+              <a:t>31/1/2023</a:t>
             </a:fld>
             <a:endParaRPr lang="en-SG" dirty="0"/>
           </a:p>
@@ -1111,7 +1199,7 @@
           <a:p>
             <a:fld id="{568D23B1-6EF9-4DFF-A006-F22E70A73051}" type="datetimeFigureOut">
               <a:rPr lang="en-SG" smtClean="0"/>
-              <a:t>4/1/2023</a:t>
+              <a:t>31/1/2023</a:t>
             </a:fld>
             <a:endParaRPr lang="en-SG" dirty="0"/>
           </a:p>
@@ -1311,7 +1399,7 @@
           <a:p>
             <a:fld id="{568D23B1-6EF9-4DFF-A006-F22E70A73051}" type="datetimeFigureOut">
               <a:rPr lang="en-SG" smtClean="0"/>
-              <a:t>4/1/2023</a:t>
+              <a:t>31/1/2023</a:t>
             </a:fld>
             <a:endParaRPr lang="en-SG" dirty="0"/>
           </a:p>
@@ -1587,7 +1675,7 @@
           <a:p>
             <a:fld id="{568D23B1-6EF9-4DFF-A006-F22E70A73051}" type="datetimeFigureOut">
               <a:rPr lang="en-SG" smtClean="0"/>
-              <a:t>4/1/2023</a:t>
+              <a:t>31/1/2023</a:t>
             </a:fld>
             <a:endParaRPr lang="en-SG" dirty="0"/>
           </a:p>
@@ -1855,7 +1943,7 @@
           <a:p>
             <a:fld id="{568D23B1-6EF9-4DFF-A006-F22E70A73051}" type="datetimeFigureOut">
               <a:rPr lang="en-SG" smtClean="0"/>
-              <a:t>4/1/2023</a:t>
+              <a:t>31/1/2023</a:t>
             </a:fld>
             <a:endParaRPr lang="en-SG" dirty="0"/>
           </a:p>
@@ -2270,7 +2358,7 @@
           <a:p>
             <a:fld id="{568D23B1-6EF9-4DFF-A006-F22E70A73051}" type="datetimeFigureOut">
               <a:rPr lang="en-SG" smtClean="0"/>
-              <a:t>4/1/2023</a:t>
+              <a:t>31/1/2023</a:t>
             </a:fld>
             <a:endParaRPr lang="en-SG" dirty="0"/>
           </a:p>
@@ -2412,7 +2500,7 @@
           <a:p>
             <a:fld id="{568D23B1-6EF9-4DFF-A006-F22E70A73051}" type="datetimeFigureOut">
               <a:rPr lang="en-SG" smtClean="0"/>
-              <a:t>4/1/2023</a:t>
+              <a:t>31/1/2023</a:t>
             </a:fld>
             <a:endParaRPr lang="en-SG" dirty="0"/>
           </a:p>
@@ -2525,7 +2613,7 @@
           <a:p>
             <a:fld id="{568D23B1-6EF9-4DFF-A006-F22E70A73051}" type="datetimeFigureOut">
               <a:rPr lang="en-SG" smtClean="0"/>
-              <a:t>4/1/2023</a:t>
+              <a:t>31/1/2023</a:t>
             </a:fld>
             <a:endParaRPr lang="en-SG" dirty="0"/>
           </a:p>
@@ -2838,7 +2926,7 @@
           <a:p>
             <a:fld id="{568D23B1-6EF9-4DFF-A006-F22E70A73051}" type="datetimeFigureOut">
               <a:rPr lang="en-SG" smtClean="0"/>
-              <a:t>4/1/2023</a:t>
+              <a:t>31/1/2023</a:t>
             </a:fld>
             <a:endParaRPr lang="en-SG" dirty="0"/>
           </a:p>
@@ -3127,7 +3215,7 @@
           <a:p>
             <a:fld id="{568D23B1-6EF9-4DFF-A006-F22E70A73051}" type="datetimeFigureOut">
               <a:rPr lang="en-SG" smtClean="0"/>
-              <a:t>4/1/2023</a:t>
+              <a:t>31/1/2023</a:t>
             </a:fld>
             <a:endParaRPr lang="en-SG" dirty="0"/>
           </a:p>
@@ -3370,7 +3458,7 @@
           <a:p>
             <a:fld id="{568D23B1-6EF9-4DFF-A006-F22E70A73051}" type="datetimeFigureOut">
               <a:rPr lang="en-SG" smtClean="0"/>
-              <a:t>4/1/2023</a:t>
+              <a:t>31/1/2023</a:t>
             </a:fld>
             <a:endParaRPr lang="en-SG" dirty="0"/>
           </a:p>
@@ -3830,7 +3918,7 @@
                   <a:schemeClr val="bg1"/>
                 </a:solidFill>
               </a:rPr>
-              <a:t>User Action Emulator  [ Introduction ] </a:t>
+              <a:t>Cluster Users Emulator [ Introduction ] </a:t>
             </a:r>
             <a:endParaRPr lang="en-SG" sz="2400" dirty="0">
               <a:solidFill>
@@ -3890,8 +3978,8 @@
         </p:nvSpPr>
         <p:spPr>
           <a:xfrm>
-            <a:off x="225195" y="801338"/>
-            <a:ext cx="6105678" cy="6001643"/>
+            <a:off x="563125" y="731765"/>
+            <a:ext cx="10876814" cy="4278094"/>
           </a:xfrm>
           <a:prstGeom prst="rect">
             <a:avLst/>
@@ -3906,7 +3994,7 @@
           <a:p>
             <a:r>
               <a:rPr lang="en-US" sz="1600" b="1" dirty="0"/>
-              <a:t>Program Design Purpose</a:t>
+              <a:t>Introduction</a:t>
             </a:r>
           </a:p>
           <a:p>
@@ -3914,1451 +4002,76 @@
           </a:p>
           <a:p>
             <a:r>
-              <a:rPr lang="en-US" sz="1600" dirty="0"/>
-              <a:t>We want to create an intelligent "actor” program which can simulate a normal MS-Windows user’s daily action ( different kinds of network access, system level operation and different app level operation) to generate user’s regular or random event based on the customer’s requirement.</a:t>
-            </a:r>
-            <a:r>
-              <a:rPr lang="en-SG" sz="1600" dirty="0"/>
+              <a:rPr lang="en-US" sz="1600" b="1" dirty="0"/>
+              <a:t>This product introduction slides will show what is Cluster User Emulator, who may be interested about using it, why user choose using this compare with other tools, technical details, the w</a:t>
+            </a:r>
+            <a:r>
+              <a:rPr lang="en-US" sz="1600" b="1" dirty="0">
+                <a:solidFill>
+                  <a:schemeClr val="tx1"/>
+                </a:solidFill>
+              </a:rPr>
+              <a:t>eaknesses of our </a:t>
+            </a:r>
+            <a:r>
+              <a:rPr lang="en-US" sz="1600" b="1" dirty="0"/>
+              <a:t>product and some product use case.</a:t>
+            </a:r>
+          </a:p>
+          <a:p>
+            <a:endParaRPr lang="en-US" sz="1600" b="1" dirty="0"/>
+          </a:p>
+          <a:p>
+            <a:r>
+              <a:rPr lang="en-US" sz="1600" b="1" dirty="0"/>
+              <a:t>Contents: </a:t>
+            </a:r>
+          </a:p>
+          <a:p>
+            <a:endParaRPr lang="en-US" sz="1600" b="1" dirty="0"/>
+          </a:p>
+          <a:p>
+            <a:r>
+              <a:rPr lang="en-US" sz="1600" b="1" dirty="0"/>
+              <a:t>Page [1, 2] : Production </a:t>
+            </a:r>
+            <a:r>
+              <a:rPr lang="en-US" sz="1600" b="1"/>
+              <a:t>Introduction (What </a:t>
+            </a:r>
+            <a:r>
+              <a:rPr lang="en-US" sz="1600" b="1" dirty="0"/>
+              <a:t>is Cluster User Emulator)</a:t>
+            </a:r>
+          </a:p>
+          <a:p>
+            <a:endParaRPr lang="en-US" sz="1600" b="1" dirty="0"/>
+          </a:p>
+          <a:p>
+            <a:endParaRPr lang="en-US" sz="1600" b="1" dirty="0"/>
+          </a:p>
+          <a:p>
+            <a:endParaRPr lang="en-US" sz="1600" b="1" dirty="0"/>
+          </a:p>
+          <a:p>
+            <a:endParaRPr lang="en-US" sz="1600" b="1" dirty="0"/>
+          </a:p>
+          <a:p>
+            <a:endParaRPr lang="en-US" sz="1600" b="1" dirty="0"/>
+          </a:p>
+          <a:p>
+            <a:endParaRPr lang="en-US" sz="1600" b="1" dirty="0"/>
+          </a:p>
+          <a:p>
+            <a:endParaRPr lang="en-US" sz="1600" b="1" dirty="0"/>
+          </a:p>
+          <a:p>
+            <a:endParaRPr lang="en-US" sz="1600" b="1" dirty="0"/>
+          </a:p>
+          <a:p>
+            <a:r>
+              <a:rPr lang="en-US" sz="1600" b="1" dirty="0"/>
               <a:t> </a:t>
-            </a:r>
-            <a:r>
-              <a:rPr lang="en-US" sz="1600" dirty="0"/>
-              <a:t>So, it can:</a:t>
-            </a:r>
-          </a:p>
-          <a:p>
-            <a:pPr marL="285750" indent="-285750">
-              <a:buFont typeface="Arial" panose="020B0604020202020204" pitchFamily="34" charset="0"/>
-              <a:buChar char="•"/>
-            </a:pPr>
-            <a:r>
-              <a:rPr lang="en-US" sz="1600" dirty="0"/>
-              <a:t>Be used to repeat/replay specified large numbers of users (blue team) activities in cyber exercise event.</a:t>
-            </a:r>
-          </a:p>
-          <a:p>
-            <a:pPr marL="285750" indent="-285750">
-              <a:buFont typeface="Arial" panose="020B0604020202020204" pitchFamily="34" charset="0"/>
-              <a:buChar char="•"/>
-            </a:pPr>
-            <a:r>
-              <a:rPr lang="en-US" sz="1600" dirty="0"/>
-              <a:t>Generate required network traffic flow for network security research project. </a:t>
-            </a:r>
-          </a:p>
-          <a:p>
-            <a:pPr marL="285750" indent="-285750">
-              <a:buFont typeface="Arial" panose="020B0604020202020204" pitchFamily="34" charset="0"/>
-              <a:buChar char="•"/>
-            </a:pPr>
-            <a:r>
-              <a:rPr lang="en-US" sz="1600" dirty="0"/>
-              <a:t>Be used as repeatable user’s test environment for AI/ML trained module’s verification.</a:t>
-            </a:r>
-          </a:p>
-          <a:p>
-            <a:pPr marL="285750" indent="-285750">
-              <a:buFont typeface="Arial" panose="020B0604020202020204" pitchFamily="34" charset="0"/>
-              <a:buChar char="•"/>
-            </a:pPr>
-            <a:endParaRPr lang="en-US" sz="1600" dirty="0"/>
-          </a:p>
-          <a:p>
-            <a:r>
-              <a:rPr lang="en-US" sz="1600" b="1" dirty="0"/>
-              <a:t>Action Feature Repository</a:t>
-            </a:r>
-            <a:r>
-              <a:rPr lang="en-US" sz="1600" dirty="0"/>
-              <a:t>: </a:t>
-            </a:r>
-          </a:p>
-          <a:p>
-            <a:r>
-              <a:rPr lang="en-US" sz="1600" dirty="0"/>
-              <a:t>Currently we provide 5 main repositories with 18 kinds of basic user action functions and 28 kinds of pre-built complex user’s actors components. The 5 main feature repositories covers: </a:t>
-            </a:r>
-          </a:p>
-          <a:p>
-            <a:endParaRPr lang="en-US" sz="1600" dirty="0"/>
-          </a:p>
-          <a:p>
-            <a:pPr marL="285750" indent="-285750">
-              <a:buFont typeface="Arial" panose="020B0604020202020204" pitchFamily="34" charset="0"/>
-              <a:buChar char="•"/>
-            </a:pPr>
-            <a:r>
-              <a:rPr lang="en-US" sz="1600" dirty="0"/>
-              <a:t>Network traffic action generators. </a:t>
-            </a:r>
-          </a:p>
-          <a:p>
-            <a:pPr marL="285750" indent="-285750">
-              <a:buFont typeface="Arial" panose="020B0604020202020204" pitchFamily="34" charset="0"/>
-              <a:buChar char="•"/>
-            </a:pPr>
-            <a:r>
-              <a:rPr lang="en-US" sz="1600" dirty="0"/>
-              <a:t>Application operation action generators. </a:t>
-            </a:r>
-          </a:p>
-          <a:p>
-            <a:pPr marL="285750" indent="-285750">
-              <a:buFont typeface="Arial" panose="020B0604020202020204" pitchFamily="34" charset="0"/>
-              <a:buChar char="•"/>
-            </a:pPr>
-            <a:r>
-              <a:rPr lang="en-US" sz="1600" dirty="0"/>
-              <a:t>User’s human activities action generators.</a:t>
-            </a:r>
-          </a:p>
-          <a:p>
-            <a:pPr marL="285750" indent="-285750">
-              <a:buFont typeface="Arial" panose="020B0604020202020204" pitchFamily="34" charset="0"/>
-              <a:buChar char="•"/>
-            </a:pPr>
-            <a:r>
-              <a:rPr lang="en-US" sz="1600" dirty="0"/>
-              <a:t>System control action generators.</a:t>
-            </a:r>
-          </a:p>
-          <a:p>
-            <a:pPr marL="285750" indent="-285750">
-              <a:buFont typeface="Arial" panose="020B0604020202020204" pitchFamily="34" charset="0"/>
-              <a:buChar char="•"/>
-            </a:pPr>
-            <a:r>
-              <a:rPr lang="en-US" sz="1600" dirty="0"/>
-              <a:t>Other action generators.</a:t>
-            </a:r>
-          </a:p>
-        </p:txBody>
-      </p:sp>
-      <p:sp>
-        <p:nvSpPr>
-          <p:cNvPr id="3" name="Rectangle 2">
-            <a:extLst>
-              <a:ext uri="{FF2B5EF4-FFF2-40B4-BE49-F238E27FC236}">
-                <a16:creationId xmlns:a16="http://schemas.microsoft.com/office/drawing/2014/main" id="{8B9CC85E-9E8F-5282-CB8D-E26C451B9CE9}"/>
-              </a:ext>
-            </a:extLst>
-          </p:cNvPr>
-          <p:cNvSpPr/>
-          <p:nvPr/>
-        </p:nvSpPr>
-        <p:spPr>
-          <a:xfrm>
-            <a:off x="6917586" y="1480930"/>
-            <a:ext cx="4294928" cy="1808923"/>
-          </a:xfrm>
-          <a:prstGeom prst="rect">
-            <a:avLst/>
-          </a:prstGeom>
-          <a:ln w="19050">
-            <a:prstDash val="sysDash"/>
-          </a:ln>
-        </p:spPr>
-        <p:style>
-          <a:lnRef idx="2">
-            <a:schemeClr val="accent6"/>
-          </a:lnRef>
-          <a:fillRef idx="1">
-            <a:schemeClr val="lt1"/>
-          </a:fillRef>
-          <a:effectRef idx="0">
-            <a:schemeClr val="accent6"/>
-          </a:effectRef>
-          <a:fontRef idx="minor">
-            <a:schemeClr val="dk1"/>
-          </a:fontRef>
-        </p:style>
-        <p:txBody>
-          <a:bodyPr rtlCol="0" anchor="ctr"/>
-          <a:lstStyle/>
-          <a:p>
-            <a:endParaRPr lang="en-SG" b="1" dirty="0"/>
-          </a:p>
-        </p:txBody>
-      </p:sp>
-      <p:sp>
-        <p:nvSpPr>
-          <p:cNvPr id="6" name="Rectangle 5">
-            <a:extLst>
-              <a:ext uri="{FF2B5EF4-FFF2-40B4-BE49-F238E27FC236}">
-                <a16:creationId xmlns:a16="http://schemas.microsoft.com/office/drawing/2014/main" id="{41B14468-2BBD-12E3-566C-3A5904E54C59}"/>
-              </a:ext>
-            </a:extLst>
-          </p:cNvPr>
-          <p:cNvSpPr/>
-          <p:nvPr/>
-        </p:nvSpPr>
-        <p:spPr>
-          <a:xfrm>
-            <a:off x="7106430" y="1649898"/>
-            <a:ext cx="1779104" cy="347870"/>
-          </a:xfrm>
-          <a:prstGeom prst="rect">
-            <a:avLst/>
-          </a:prstGeom>
-        </p:spPr>
-        <p:style>
-          <a:lnRef idx="2">
-            <a:schemeClr val="accent1">
-              <a:shade val="50000"/>
-            </a:schemeClr>
-          </a:lnRef>
-          <a:fillRef idx="1">
-            <a:schemeClr val="accent1"/>
-          </a:fillRef>
-          <a:effectRef idx="0">
-            <a:schemeClr val="accent1"/>
-          </a:effectRef>
-          <a:fontRef idx="minor">
-            <a:schemeClr val="lt1"/>
-          </a:fontRef>
-        </p:style>
-        <p:txBody>
-          <a:bodyPr rtlCol="0" anchor="ctr"/>
-          <a:lstStyle/>
-          <a:p>
-            <a:pPr algn="ctr"/>
-            <a:r>
-              <a:rPr lang="en-US" sz="1200" dirty="0"/>
-              <a:t>Network Traffic Actors</a:t>
-            </a:r>
-            <a:r>
-              <a:rPr lang="en-SG" sz="1200" dirty="0"/>
-              <a:t> </a:t>
-            </a:r>
-          </a:p>
-        </p:txBody>
-      </p:sp>
-      <p:sp>
-        <p:nvSpPr>
-          <p:cNvPr id="7" name="Rectangle 6">
-            <a:extLst>
-              <a:ext uri="{FF2B5EF4-FFF2-40B4-BE49-F238E27FC236}">
-                <a16:creationId xmlns:a16="http://schemas.microsoft.com/office/drawing/2014/main" id="{9A400251-D941-6F21-90EA-035F90983AF2}"/>
-              </a:ext>
-            </a:extLst>
-          </p:cNvPr>
-          <p:cNvSpPr/>
-          <p:nvPr/>
-        </p:nvSpPr>
-        <p:spPr>
-          <a:xfrm>
-            <a:off x="7106430" y="2199864"/>
-            <a:ext cx="1779104" cy="347870"/>
-          </a:xfrm>
-          <a:prstGeom prst="rect">
-            <a:avLst/>
-          </a:prstGeom>
-          <a:solidFill>
-            <a:schemeClr val="accent6">
-              <a:lumMod val="75000"/>
-            </a:schemeClr>
-          </a:solidFill>
-        </p:spPr>
-        <p:style>
-          <a:lnRef idx="2">
-            <a:schemeClr val="accent1">
-              <a:shade val="50000"/>
-            </a:schemeClr>
-          </a:lnRef>
-          <a:fillRef idx="1">
-            <a:schemeClr val="accent1"/>
-          </a:fillRef>
-          <a:effectRef idx="0">
-            <a:schemeClr val="accent1"/>
-          </a:effectRef>
-          <a:fontRef idx="minor">
-            <a:schemeClr val="lt1"/>
-          </a:fontRef>
-        </p:style>
-        <p:txBody>
-          <a:bodyPr rtlCol="0" anchor="ctr"/>
-          <a:lstStyle/>
-          <a:p>
-            <a:pPr algn="ctr"/>
-            <a:r>
-              <a:rPr lang="en-US" sz="1200" dirty="0"/>
-              <a:t>App Operations Actors</a:t>
-            </a:r>
-            <a:r>
-              <a:rPr lang="en-SG" sz="1200" dirty="0"/>
-              <a:t> </a:t>
-            </a:r>
-          </a:p>
-        </p:txBody>
-      </p:sp>
-      <p:sp>
-        <p:nvSpPr>
-          <p:cNvPr id="8" name="Rectangle 7">
-            <a:extLst>
-              <a:ext uri="{FF2B5EF4-FFF2-40B4-BE49-F238E27FC236}">
-                <a16:creationId xmlns:a16="http://schemas.microsoft.com/office/drawing/2014/main" id="{8DA0F4ED-FD86-CB66-6541-1086CD4D68D9}"/>
-              </a:ext>
-            </a:extLst>
-          </p:cNvPr>
-          <p:cNvSpPr/>
-          <p:nvPr/>
-        </p:nvSpPr>
-        <p:spPr>
-          <a:xfrm>
-            <a:off x="7106430" y="2749830"/>
-            <a:ext cx="1779104" cy="347870"/>
-          </a:xfrm>
-          <a:prstGeom prst="rect">
-            <a:avLst/>
-          </a:prstGeom>
-          <a:solidFill>
-            <a:schemeClr val="accent2">
-              <a:lumMod val="75000"/>
-            </a:schemeClr>
-          </a:solidFill>
-        </p:spPr>
-        <p:style>
-          <a:lnRef idx="2">
-            <a:schemeClr val="accent1">
-              <a:shade val="50000"/>
-            </a:schemeClr>
-          </a:lnRef>
-          <a:fillRef idx="1">
-            <a:schemeClr val="accent1"/>
-          </a:fillRef>
-          <a:effectRef idx="0">
-            <a:schemeClr val="accent1"/>
-          </a:effectRef>
-          <a:fontRef idx="minor">
-            <a:schemeClr val="lt1"/>
-          </a:fontRef>
-        </p:style>
-        <p:txBody>
-          <a:bodyPr rtlCol="0" anchor="ctr"/>
-          <a:lstStyle/>
-          <a:p>
-            <a:pPr algn="ctr"/>
-            <a:r>
-              <a:rPr lang="en-US" sz="1200" dirty="0"/>
-              <a:t>System Operation Actors</a:t>
-            </a:r>
-            <a:r>
-              <a:rPr lang="en-SG" sz="1200" dirty="0"/>
-              <a:t> </a:t>
-            </a:r>
-          </a:p>
-        </p:txBody>
-      </p:sp>
-      <p:sp>
-        <p:nvSpPr>
-          <p:cNvPr id="9" name="Rectangle 8">
-            <a:extLst>
-              <a:ext uri="{FF2B5EF4-FFF2-40B4-BE49-F238E27FC236}">
-                <a16:creationId xmlns:a16="http://schemas.microsoft.com/office/drawing/2014/main" id="{A2BC870F-DE85-1C71-EDBA-6526EC69D9ED}"/>
-              </a:ext>
-            </a:extLst>
-          </p:cNvPr>
-          <p:cNvSpPr/>
-          <p:nvPr/>
-        </p:nvSpPr>
-        <p:spPr>
-          <a:xfrm>
-            <a:off x="9157204" y="1649898"/>
-            <a:ext cx="1679713" cy="347870"/>
-          </a:xfrm>
-          <a:prstGeom prst="rect">
-            <a:avLst/>
-          </a:prstGeom>
-          <a:solidFill>
-            <a:schemeClr val="tx2">
-              <a:lumMod val="75000"/>
-            </a:schemeClr>
-          </a:solidFill>
-        </p:spPr>
-        <p:style>
-          <a:lnRef idx="2">
-            <a:schemeClr val="accent1">
-              <a:shade val="50000"/>
-            </a:schemeClr>
-          </a:lnRef>
-          <a:fillRef idx="1">
-            <a:schemeClr val="accent1"/>
-          </a:fillRef>
-          <a:effectRef idx="0">
-            <a:schemeClr val="accent1"/>
-          </a:effectRef>
-          <a:fontRef idx="minor">
-            <a:schemeClr val="lt1"/>
-          </a:fontRef>
-        </p:style>
-        <p:txBody>
-          <a:bodyPr rtlCol="0" anchor="ctr"/>
-          <a:lstStyle/>
-          <a:p>
-            <a:pPr algn="ctr"/>
-            <a:r>
-              <a:rPr lang="en-US" sz="1200" dirty="0"/>
-              <a:t>Human Activities Actors</a:t>
-            </a:r>
-            <a:endParaRPr lang="en-SG" sz="1200" dirty="0"/>
-          </a:p>
-        </p:txBody>
-      </p:sp>
-      <p:sp>
-        <p:nvSpPr>
-          <p:cNvPr id="10" name="Rectangle 9">
-            <a:extLst>
-              <a:ext uri="{FF2B5EF4-FFF2-40B4-BE49-F238E27FC236}">
-                <a16:creationId xmlns:a16="http://schemas.microsoft.com/office/drawing/2014/main" id="{5D59993C-82C5-3891-6F20-7AF4B09E5E35}"/>
-              </a:ext>
-            </a:extLst>
-          </p:cNvPr>
-          <p:cNvSpPr/>
-          <p:nvPr/>
-        </p:nvSpPr>
-        <p:spPr>
-          <a:xfrm>
-            <a:off x="9157204" y="2199864"/>
-            <a:ext cx="1679713" cy="347870"/>
-          </a:xfrm>
-          <a:prstGeom prst="rect">
-            <a:avLst/>
-          </a:prstGeom>
-          <a:solidFill>
-            <a:schemeClr val="bg1">
-              <a:lumMod val="65000"/>
-            </a:schemeClr>
-          </a:solidFill>
-        </p:spPr>
-        <p:style>
-          <a:lnRef idx="2">
-            <a:schemeClr val="accent1">
-              <a:shade val="50000"/>
-            </a:schemeClr>
-          </a:lnRef>
-          <a:fillRef idx="1">
-            <a:schemeClr val="accent1"/>
-          </a:fillRef>
-          <a:effectRef idx="0">
-            <a:schemeClr val="accent1"/>
-          </a:effectRef>
-          <a:fontRef idx="minor">
-            <a:schemeClr val="lt1"/>
-          </a:fontRef>
-        </p:style>
-        <p:txBody>
-          <a:bodyPr rtlCol="0" anchor="ctr"/>
-          <a:lstStyle/>
-          <a:p>
-            <a:pPr algn="ctr"/>
-            <a:r>
-              <a:rPr lang="en-US" sz="1200" dirty="0"/>
-              <a:t>Other Action Actors</a:t>
-            </a:r>
-            <a:endParaRPr lang="en-SG" sz="1200" dirty="0"/>
-          </a:p>
-        </p:txBody>
-      </p:sp>
-      <p:sp>
-        <p:nvSpPr>
-          <p:cNvPr id="11" name="TextBox 10">
-            <a:extLst>
-              <a:ext uri="{FF2B5EF4-FFF2-40B4-BE49-F238E27FC236}">
-                <a16:creationId xmlns:a16="http://schemas.microsoft.com/office/drawing/2014/main" id="{98A338EA-9A49-BE11-7B56-B7F1642713B2}"/>
-              </a:ext>
-            </a:extLst>
-          </p:cNvPr>
-          <p:cNvSpPr txBox="1"/>
-          <p:nvPr/>
-        </p:nvSpPr>
-        <p:spPr>
-          <a:xfrm>
-            <a:off x="9572991" y="2846423"/>
-            <a:ext cx="2297595" cy="430887"/>
-          </a:xfrm>
-          <a:prstGeom prst="rect">
-            <a:avLst/>
-          </a:prstGeom>
-          <a:noFill/>
-        </p:spPr>
-        <p:txBody>
-          <a:bodyPr wrap="square" rtlCol="0">
-            <a:spAutoFit/>
-          </a:bodyPr>
-          <a:lstStyle/>
-          <a:p>
-            <a:r>
-              <a:rPr lang="en-SG" sz="1100" b="1" dirty="0"/>
-              <a:t>Actors (event generator) repositories  </a:t>
-            </a:r>
-          </a:p>
-        </p:txBody>
-      </p:sp>
-      <p:sp>
-        <p:nvSpPr>
-          <p:cNvPr id="12" name="Arrow: Down 11">
-            <a:extLst>
-              <a:ext uri="{FF2B5EF4-FFF2-40B4-BE49-F238E27FC236}">
-                <a16:creationId xmlns:a16="http://schemas.microsoft.com/office/drawing/2014/main" id="{7D11EB6F-7A8C-6FC5-30CD-AF258002E0D8}"/>
-              </a:ext>
-            </a:extLst>
-          </p:cNvPr>
-          <p:cNvSpPr/>
-          <p:nvPr/>
-        </p:nvSpPr>
-        <p:spPr>
-          <a:xfrm>
-            <a:off x="8498520" y="3458821"/>
-            <a:ext cx="109330" cy="626165"/>
-          </a:xfrm>
-          <a:prstGeom prst="downArrow">
-            <a:avLst/>
-          </a:prstGeom>
-        </p:spPr>
-        <p:style>
-          <a:lnRef idx="2">
-            <a:schemeClr val="accent1">
-              <a:shade val="50000"/>
-            </a:schemeClr>
-          </a:lnRef>
-          <a:fillRef idx="1">
-            <a:schemeClr val="accent1"/>
-          </a:fillRef>
-          <a:effectRef idx="0">
-            <a:schemeClr val="accent1"/>
-          </a:effectRef>
-          <a:fontRef idx="minor">
-            <a:schemeClr val="lt1"/>
-          </a:fontRef>
-        </p:style>
-        <p:txBody>
-          <a:bodyPr rtlCol="0" anchor="ctr"/>
-          <a:lstStyle/>
-          <a:p>
-            <a:pPr algn="ctr"/>
-            <a:endParaRPr lang="en-SG" dirty="0"/>
-          </a:p>
-        </p:txBody>
-      </p:sp>
-      <p:sp>
-        <p:nvSpPr>
-          <p:cNvPr id="13" name="Rectangle 12">
-            <a:extLst>
-              <a:ext uri="{FF2B5EF4-FFF2-40B4-BE49-F238E27FC236}">
-                <a16:creationId xmlns:a16="http://schemas.microsoft.com/office/drawing/2014/main" id="{FD120891-05D6-87C6-183E-FA256CAB5BFE}"/>
-              </a:ext>
-            </a:extLst>
-          </p:cNvPr>
-          <p:cNvSpPr/>
-          <p:nvPr/>
-        </p:nvSpPr>
-        <p:spPr>
-          <a:xfrm>
-            <a:off x="8105315" y="4148408"/>
-            <a:ext cx="1467676" cy="347870"/>
-          </a:xfrm>
-          <a:prstGeom prst="rect">
-            <a:avLst/>
-          </a:prstGeom>
-        </p:spPr>
-        <p:style>
-          <a:lnRef idx="2">
-            <a:schemeClr val="accent1">
-              <a:shade val="50000"/>
-            </a:schemeClr>
-          </a:lnRef>
-          <a:fillRef idx="1">
-            <a:schemeClr val="accent1"/>
-          </a:fillRef>
-          <a:effectRef idx="0">
-            <a:schemeClr val="accent1"/>
-          </a:effectRef>
-          <a:fontRef idx="minor">
-            <a:schemeClr val="lt1"/>
-          </a:fontRef>
-        </p:style>
-        <p:txBody>
-          <a:bodyPr rtlCol="0" anchor="ctr"/>
-          <a:lstStyle/>
-          <a:p>
-            <a:pPr algn="ctr"/>
-            <a:r>
-              <a:rPr lang="en-SG" sz="1200" b="1" dirty="0"/>
-              <a:t>Action scheduler </a:t>
-            </a:r>
-          </a:p>
-        </p:txBody>
-      </p:sp>
-      <p:pic>
-        <p:nvPicPr>
-          <p:cNvPr id="14" name="Picture 13">
-            <a:extLst>
-              <a:ext uri="{FF2B5EF4-FFF2-40B4-BE49-F238E27FC236}">
-                <a16:creationId xmlns:a16="http://schemas.microsoft.com/office/drawing/2014/main" id="{B81FA487-D6DD-3E41-067F-2B2C62DF0521}"/>
-              </a:ext>
-            </a:extLst>
-          </p:cNvPr>
-          <p:cNvPicPr>
-            <a:picLocks noChangeAspect="1"/>
-          </p:cNvPicPr>
-          <p:nvPr/>
-        </p:nvPicPr>
-        <p:blipFill>
-          <a:blip r:embed="rId3"/>
-          <a:stretch>
-            <a:fillRect/>
-          </a:stretch>
-        </p:blipFill>
-        <p:spPr>
-          <a:xfrm>
-            <a:off x="10220256" y="4079078"/>
-            <a:ext cx="411108" cy="424159"/>
-          </a:xfrm>
-          <a:prstGeom prst="rect">
-            <a:avLst/>
-          </a:prstGeom>
-          <a:ln w="3175">
-            <a:solidFill>
-              <a:schemeClr val="tx1"/>
-            </a:solidFill>
-          </a:ln>
-        </p:spPr>
-      </p:pic>
-      <p:sp>
-        <p:nvSpPr>
-          <p:cNvPr id="15" name="TextBox 14">
-            <a:extLst>
-              <a:ext uri="{FF2B5EF4-FFF2-40B4-BE49-F238E27FC236}">
-                <a16:creationId xmlns:a16="http://schemas.microsoft.com/office/drawing/2014/main" id="{BD358BBD-5780-8DD3-4967-EA1A140D17C4}"/>
-              </a:ext>
-            </a:extLst>
-          </p:cNvPr>
-          <p:cNvSpPr txBox="1"/>
-          <p:nvPr/>
-        </p:nvSpPr>
-        <p:spPr>
-          <a:xfrm>
-            <a:off x="9277012" y="3525161"/>
-            <a:ext cx="2297595" cy="430887"/>
-          </a:xfrm>
-          <a:prstGeom prst="rect">
-            <a:avLst/>
-          </a:prstGeom>
-          <a:noFill/>
-        </p:spPr>
-        <p:txBody>
-          <a:bodyPr wrap="square" rtlCol="0">
-            <a:spAutoFit/>
-          </a:bodyPr>
-          <a:lstStyle/>
-          <a:p>
-            <a:r>
-              <a:rPr lang="en-SG" sz="1100" b="1" dirty="0"/>
-              <a:t>Customers reequipment config file (event time line)</a:t>
-            </a:r>
-          </a:p>
-        </p:txBody>
-      </p:sp>
-      <p:cxnSp>
-        <p:nvCxnSpPr>
-          <p:cNvPr id="16" name="Straight Arrow Connector 15">
-            <a:extLst>
-              <a:ext uri="{FF2B5EF4-FFF2-40B4-BE49-F238E27FC236}">
-                <a16:creationId xmlns:a16="http://schemas.microsoft.com/office/drawing/2014/main" id="{BA7788AA-D82F-AFA9-9013-A6202A45B45F}"/>
-              </a:ext>
-            </a:extLst>
-          </p:cNvPr>
-          <p:cNvCxnSpPr>
-            <a:cxnSpLocks/>
-          </p:cNvCxnSpPr>
-          <p:nvPr/>
-        </p:nvCxnSpPr>
-        <p:spPr>
-          <a:xfrm flipH="1">
-            <a:off x="9670725" y="4243728"/>
-            <a:ext cx="447261" cy="0"/>
-          </a:xfrm>
-          <a:prstGeom prst="straightConnector1">
-            <a:avLst/>
-          </a:prstGeom>
-          <a:ln w="28575">
-            <a:tailEnd type="triangle"/>
-          </a:ln>
-        </p:spPr>
-        <p:style>
-          <a:lnRef idx="1">
-            <a:schemeClr val="accent1"/>
-          </a:lnRef>
-          <a:fillRef idx="0">
-            <a:schemeClr val="accent1"/>
-          </a:fillRef>
-          <a:effectRef idx="0">
-            <a:schemeClr val="accent1"/>
-          </a:effectRef>
-          <a:fontRef idx="minor">
-            <a:schemeClr val="tx1"/>
-          </a:fontRef>
-        </p:style>
-      </p:cxnSp>
-      <p:cxnSp>
-        <p:nvCxnSpPr>
-          <p:cNvPr id="17" name="Straight Arrow Connector 16">
-            <a:extLst>
-              <a:ext uri="{FF2B5EF4-FFF2-40B4-BE49-F238E27FC236}">
-                <a16:creationId xmlns:a16="http://schemas.microsoft.com/office/drawing/2014/main" id="{D8917820-1BB1-7D9F-88A2-3B5BAE5E0755}"/>
-              </a:ext>
-            </a:extLst>
-          </p:cNvPr>
-          <p:cNvCxnSpPr>
-            <a:cxnSpLocks/>
-          </p:cNvCxnSpPr>
-          <p:nvPr/>
-        </p:nvCxnSpPr>
-        <p:spPr>
-          <a:xfrm>
-            <a:off x="8784486" y="4496278"/>
-            <a:ext cx="0" cy="383836"/>
-          </a:xfrm>
-          <a:prstGeom prst="straightConnector1">
-            <a:avLst/>
-          </a:prstGeom>
-          <a:ln w="19050">
-            <a:tailEnd type="triangle"/>
-          </a:ln>
-        </p:spPr>
-        <p:style>
-          <a:lnRef idx="1">
-            <a:schemeClr val="accent1"/>
-          </a:lnRef>
-          <a:fillRef idx="0">
-            <a:schemeClr val="accent1"/>
-          </a:fillRef>
-          <a:effectRef idx="0">
-            <a:schemeClr val="accent1"/>
-          </a:effectRef>
-          <a:fontRef idx="minor">
-            <a:schemeClr val="tx1"/>
-          </a:fontRef>
-        </p:style>
-      </p:cxnSp>
-      <p:sp>
-        <p:nvSpPr>
-          <p:cNvPr id="18" name="Rectangle 17">
-            <a:extLst>
-              <a:ext uri="{FF2B5EF4-FFF2-40B4-BE49-F238E27FC236}">
-                <a16:creationId xmlns:a16="http://schemas.microsoft.com/office/drawing/2014/main" id="{BCB6B898-448C-71C6-8490-F2D520981E60}"/>
-              </a:ext>
-            </a:extLst>
-          </p:cNvPr>
-          <p:cNvSpPr/>
-          <p:nvPr/>
-        </p:nvSpPr>
-        <p:spPr>
-          <a:xfrm>
-            <a:off x="8189795" y="4943541"/>
-            <a:ext cx="1292088" cy="347870"/>
-          </a:xfrm>
-          <a:prstGeom prst="rect">
-            <a:avLst/>
-          </a:prstGeom>
-        </p:spPr>
-        <p:style>
-          <a:lnRef idx="2">
-            <a:schemeClr val="accent1">
-              <a:shade val="50000"/>
-            </a:schemeClr>
-          </a:lnRef>
-          <a:fillRef idx="1">
-            <a:schemeClr val="accent1"/>
-          </a:fillRef>
-          <a:effectRef idx="0">
-            <a:schemeClr val="accent1"/>
-          </a:effectRef>
-          <a:fontRef idx="minor">
-            <a:schemeClr val="lt1"/>
-          </a:fontRef>
-        </p:style>
-        <p:txBody>
-          <a:bodyPr rtlCol="0" anchor="ctr"/>
-          <a:lstStyle/>
-          <a:p>
-            <a:pPr algn="ctr"/>
-            <a:r>
-              <a:rPr lang="en-SG" sz="1200" b="1" dirty="0"/>
-              <a:t>User emulator </a:t>
-            </a:r>
-          </a:p>
-        </p:txBody>
-      </p:sp>
-      <p:sp>
-        <p:nvSpPr>
-          <p:cNvPr id="19" name="TextBox 18">
-            <a:extLst>
-              <a:ext uri="{FF2B5EF4-FFF2-40B4-BE49-F238E27FC236}">
-                <a16:creationId xmlns:a16="http://schemas.microsoft.com/office/drawing/2014/main" id="{4CA308FB-C049-401C-A0A7-743F6F7A4FE4}"/>
-              </a:ext>
-            </a:extLst>
-          </p:cNvPr>
-          <p:cNvSpPr txBox="1"/>
-          <p:nvPr/>
-        </p:nvSpPr>
-        <p:spPr>
-          <a:xfrm>
-            <a:off x="9578499" y="4943541"/>
-            <a:ext cx="347472" cy="369332"/>
-          </a:xfrm>
-          <a:prstGeom prst="rect">
-            <a:avLst/>
-          </a:prstGeom>
-          <a:noFill/>
-        </p:spPr>
-        <p:txBody>
-          <a:bodyPr wrap="square" rtlCol="0">
-            <a:spAutoFit/>
-          </a:bodyPr>
-          <a:lstStyle/>
-          <a:p>
-            <a:r>
-              <a:rPr lang="en-SG" dirty="0"/>
-              <a:t>…</a:t>
-            </a:r>
-          </a:p>
-        </p:txBody>
-      </p:sp>
-      <p:sp>
-        <p:nvSpPr>
-          <p:cNvPr id="20" name="Rectangle 19">
-            <a:extLst>
-              <a:ext uri="{FF2B5EF4-FFF2-40B4-BE49-F238E27FC236}">
-                <a16:creationId xmlns:a16="http://schemas.microsoft.com/office/drawing/2014/main" id="{BD7449EA-BA0D-4CDF-9276-51B639D85158}"/>
-              </a:ext>
-            </a:extLst>
-          </p:cNvPr>
-          <p:cNvSpPr/>
-          <p:nvPr/>
-        </p:nvSpPr>
-        <p:spPr>
-          <a:xfrm>
-            <a:off x="9925971" y="4926038"/>
-            <a:ext cx="1266806" cy="347870"/>
-          </a:xfrm>
-          <a:prstGeom prst="rect">
-            <a:avLst/>
-          </a:prstGeom>
-        </p:spPr>
-        <p:style>
-          <a:lnRef idx="2">
-            <a:schemeClr val="accent1">
-              <a:shade val="50000"/>
-            </a:schemeClr>
-          </a:lnRef>
-          <a:fillRef idx="1">
-            <a:schemeClr val="accent1"/>
-          </a:fillRef>
-          <a:effectRef idx="0">
-            <a:schemeClr val="accent1"/>
-          </a:effectRef>
-          <a:fontRef idx="minor">
-            <a:schemeClr val="lt1"/>
-          </a:fontRef>
-        </p:style>
-        <p:txBody>
-          <a:bodyPr rtlCol="0" anchor="ctr"/>
-          <a:lstStyle/>
-          <a:p>
-            <a:pPr algn="ctr"/>
-            <a:r>
-              <a:rPr lang="en-SG" sz="1200" b="1" dirty="0"/>
-              <a:t>User emulator </a:t>
-            </a:r>
-          </a:p>
-        </p:txBody>
-      </p:sp>
-      <p:cxnSp>
-        <p:nvCxnSpPr>
-          <p:cNvPr id="21" name="Straight Arrow Connector 20">
-            <a:extLst>
-              <a:ext uri="{FF2B5EF4-FFF2-40B4-BE49-F238E27FC236}">
-                <a16:creationId xmlns:a16="http://schemas.microsoft.com/office/drawing/2014/main" id="{0D9ED025-0ECF-55DC-C469-6FBC6BD2C3ED}"/>
-              </a:ext>
-            </a:extLst>
-          </p:cNvPr>
-          <p:cNvCxnSpPr>
-            <a:cxnSpLocks/>
-          </p:cNvCxnSpPr>
-          <p:nvPr/>
-        </p:nvCxnSpPr>
-        <p:spPr>
-          <a:xfrm>
-            <a:off x="7317709" y="5381923"/>
-            <a:ext cx="0" cy="314786"/>
-          </a:xfrm>
-          <a:prstGeom prst="straightConnector1">
-            <a:avLst/>
-          </a:prstGeom>
-          <a:ln w="19050">
-            <a:tailEnd type="triangle"/>
-          </a:ln>
-        </p:spPr>
-        <p:style>
-          <a:lnRef idx="1">
-            <a:schemeClr val="accent1"/>
-          </a:lnRef>
-          <a:fillRef idx="0">
-            <a:schemeClr val="accent1"/>
-          </a:fillRef>
-          <a:effectRef idx="0">
-            <a:schemeClr val="accent1"/>
-          </a:effectRef>
-          <a:fontRef idx="minor">
-            <a:schemeClr val="tx1"/>
-          </a:fontRef>
-        </p:style>
-      </p:cxnSp>
-      <p:cxnSp>
-        <p:nvCxnSpPr>
-          <p:cNvPr id="22" name="Straight Arrow Connector 21">
-            <a:extLst>
-              <a:ext uri="{FF2B5EF4-FFF2-40B4-BE49-F238E27FC236}">
-                <a16:creationId xmlns:a16="http://schemas.microsoft.com/office/drawing/2014/main" id="{85D71205-A5E8-8755-DA56-2AB4DA15A130}"/>
-              </a:ext>
-            </a:extLst>
-          </p:cNvPr>
-          <p:cNvCxnSpPr>
-            <a:cxnSpLocks/>
-          </p:cNvCxnSpPr>
-          <p:nvPr/>
-        </p:nvCxnSpPr>
-        <p:spPr>
-          <a:xfrm flipH="1">
-            <a:off x="9362612" y="5309638"/>
-            <a:ext cx="573298" cy="387071"/>
-          </a:xfrm>
-          <a:prstGeom prst="straightConnector1">
-            <a:avLst/>
-          </a:prstGeom>
-          <a:ln w="19050">
-            <a:tailEnd type="triangle"/>
-          </a:ln>
-        </p:spPr>
-        <p:style>
-          <a:lnRef idx="1">
-            <a:schemeClr val="accent1"/>
-          </a:lnRef>
-          <a:fillRef idx="0">
-            <a:schemeClr val="accent1"/>
-          </a:fillRef>
-          <a:effectRef idx="0">
-            <a:schemeClr val="accent1"/>
-          </a:effectRef>
-          <a:fontRef idx="minor">
-            <a:schemeClr val="tx1"/>
-          </a:fontRef>
-        </p:style>
-      </p:cxnSp>
-      <p:sp>
-        <p:nvSpPr>
-          <p:cNvPr id="23" name="Rectangle 22">
-            <a:extLst>
-              <a:ext uri="{FF2B5EF4-FFF2-40B4-BE49-F238E27FC236}">
-                <a16:creationId xmlns:a16="http://schemas.microsoft.com/office/drawing/2014/main" id="{17FF272C-A374-4CCF-19CE-9F44E1D1F31F}"/>
-              </a:ext>
-            </a:extLst>
-          </p:cNvPr>
-          <p:cNvSpPr/>
-          <p:nvPr/>
-        </p:nvSpPr>
-        <p:spPr>
-          <a:xfrm>
-            <a:off x="7074621" y="5782282"/>
-            <a:ext cx="2468553" cy="347870"/>
-          </a:xfrm>
-          <a:prstGeom prst="rect">
-            <a:avLst/>
-          </a:prstGeom>
-        </p:spPr>
-        <p:style>
-          <a:lnRef idx="2">
-            <a:schemeClr val="accent1">
-              <a:shade val="50000"/>
-            </a:schemeClr>
-          </a:lnRef>
-          <a:fillRef idx="1">
-            <a:schemeClr val="accent1"/>
-          </a:fillRef>
-          <a:effectRef idx="0">
-            <a:schemeClr val="accent1"/>
-          </a:effectRef>
-          <a:fontRef idx="minor">
-            <a:schemeClr val="lt1"/>
-          </a:fontRef>
-        </p:style>
-        <p:txBody>
-          <a:bodyPr rtlCol="0" anchor="ctr"/>
-          <a:lstStyle/>
-          <a:p>
-            <a:pPr algn="ctr"/>
-            <a:r>
-              <a:rPr lang="en-SG" sz="1200" b="1" dirty="0"/>
-              <a:t>Scenario / users group emulator </a:t>
-            </a:r>
-          </a:p>
-        </p:txBody>
-      </p:sp>
-      <p:sp>
-        <p:nvSpPr>
-          <p:cNvPr id="24" name="Rectangle 23">
-            <a:extLst>
-              <a:ext uri="{FF2B5EF4-FFF2-40B4-BE49-F238E27FC236}">
-                <a16:creationId xmlns:a16="http://schemas.microsoft.com/office/drawing/2014/main" id="{8F3EFF47-AE97-B80D-147E-2B09418A0594}"/>
-              </a:ext>
-            </a:extLst>
-          </p:cNvPr>
-          <p:cNvSpPr/>
-          <p:nvPr/>
-        </p:nvSpPr>
-        <p:spPr>
-          <a:xfrm>
-            <a:off x="6596010" y="4961768"/>
-            <a:ext cx="1431375" cy="347870"/>
-          </a:xfrm>
-          <a:prstGeom prst="rect">
-            <a:avLst/>
-          </a:prstGeom>
-        </p:spPr>
-        <p:style>
-          <a:lnRef idx="2">
-            <a:schemeClr val="accent1">
-              <a:shade val="50000"/>
-            </a:schemeClr>
-          </a:lnRef>
-          <a:fillRef idx="1">
-            <a:schemeClr val="accent1"/>
-          </a:fillRef>
-          <a:effectRef idx="0">
-            <a:schemeClr val="accent1"/>
-          </a:effectRef>
-          <a:fontRef idx="minor">
-            <a:schemeClr val="lt1"/>
-          </a:fontRef>
-        </p:style>
-        <p:txBody>
-          <a:bodyPr rtlCol="0" anchor="ctr"/>
-          <a:lstStyle/>
-          <a:p>
-            <a:pPr algn="ctr"/>
-            <a:r>
-              <a:rPr lang="en-SG" sz="1200" b="1" dirty="0"/>
-              <a:t>Environment config</a:t>
-            </a:r>
-          </a:p>
-        </p:txBody>
-      </p:sp>
-      <p:cxnSp>
-        <p:nvCxnSpPr>
-          <p:cNvPr id="25" name="Straight Arrow Connector 24">
-            <a:extLst>
-              <a:ext uri="{FF2B5EF4-FFF2-40B4-BE49-F238E27FC236}">
-                <a16:creationId xmlns:a16="http://schemas.microsoft.com/office/drawing/2014/main" id="{3E2A39F8-7133-F104-938F-F414F3139440}"/>
-              </a:ext>
-            </a:extLst>
-          </p:cNvPr>
-          <p:cNvCxnSpPr>
-            <a:cxnSpLocks/>
-          </p:cNvCxnSpPr>
-          <p:nvPr/>
-        </p:nvCxnSpPr>
-        <p:spPr>
-          <a:xfrm>
-            <a:off x="8784486" y="5381923"/>
-            <a:ext cx="0" cy="314786"/>
-          </a:xfrm>
-          <a:prstGeom prst="straightConnector1">
-            <a:avLst/>
-          </a:prstGeom>
-          <a:ln w="19050">
-            <a:tailEnd type="triangle"/>
-          </a:ln>
-        </p:spPr>
-        <p:style>
-          <a:lnRef idx="1">
-            <a:schemeClr val="accent1"/>
-          </a:lnRef>
-          <a:fillRef idx="0">
-            <a:schemeClr val="accent1"/>
-          </a:fillRef>
-          <a:effectRef idx="0">
-            <a:schemeClr val="accent1"/>
-          </a:effectRef>
-          <a:fontRef idx="minor">
-            <a:schemeClr val="tx1"/>
-          </a:fontRef>
-        </p:style>
-      </p:cxnSp>
-      <p:pic>
-        <p:nvPicPr>
-          <p:cNvPr id="26" name="Picture 25">
-            <a:extLst>
-              <a:ext uri="{FF2B5EF4-FFF2-40B4-BE49-F238E27FC236}">
-                <a16:creationId xmlns:a16="http://schemas.microsoft.com/office/drawing/2014/main" id="{1DAC9822-7DEB-0BD0-6F1B-608BB4DF4F5C}"/>
-              </a:ext>
-            </a:extLst>
-          </p:cNvPr>
-          <p:cNvPicPr>
-            <a:picLocks noChangeAspect="1"/>
-          </p:cNvPicPr>
-          <p:nvPr/>
-        </p:nvPicPr>
-        <p:blipFill>
-          <a:blip r:embed="rId3"/>
-          <a:stretch>
-            <a:fillRect/>
-          </a:stretch>
-        </p:blipFill>
-        <p:spPr>
-          <a:xfrm>
-            <a:off x="7040043" y="4213801"/>
-            <a:ext cx="411108" cy="424159"/>
-          </a:xfrm>
-          <a:prstGeom prst="rect">
-            <a:avLst/>
-          </a:prstGeom>
-          <a:ln w="3175">
-            <a:solidFill>
-              <a:schemeClr val="tx1"/>
-            </a:solidFill>
-          </a:ln>
-        </p:spPr>
-      </p:pic>
-      <p:cxnSp>
-        <p:nvCxnSpPr>
-          <p:cNvPr id="27" name="Straight Arrow Connector 26">
-            <a:extLst>
-              <a:ext uri="{FF2B5EF4-FFF2-40B4-BE49-F238E27FC236}">
-                <a16:creationId xmlns:a16="http://schemas.microsoft.com/office/drawing/2014/main" id="{33F52BF5-8507-2CEA-CA56-6BDBB6A0218C}"/>
-              </a:ext>
-            </a:extLst>
-          </p:cNvPr>
-          <p:cNvCxnSpPr>
-            <a:cxnSpLocks/>
-          </p:cNvCxnSpPr>
-          <p:nvPr/>
-        </p:nvCxnSpPr>
-        <p:spPr>
-          <a:xfrm flipH="1">
-            <a:off x="7285807" y="4712373"/>
-            <a:ext cx="5725" cy="211356"/>
-          </a:xfrm>
-          <a:prstGeom prst="straightConnector1">
-            <a:avLst/>
-          </a:prstGeom>
-          <a:ln w="28575">
-            <a:tailEnd type="triangle"/>
-          </a:ln>
-        </p:spPr>
-        <p:style>
-          <a:lnRef idx="1">
-            <a:schemeClr val="accent1"/>
-          </a:lnRef>
-          <a:fillRef idx="0">
-            <a:schemeClr val="accent1"/>
-          </a:fillRef>
-          <a:effectRef idx="0">
-            <a:schemeClr val="accent1"/>
-          </a:effectRef>
-          <a:fontRef idx="minor">
-            <a:schemeClr val="tx1"/>
-          </a:fontRef>
-        </p:style>
-      </p:cxnSp>
-      <p:sp>
-        <p:nvSpPr>
-          <p:cNvPr id="28" name="TextBox 27">
-            <a:extLst>
-              <a:ext uri="{FF2B5EF4-FFF2-40B4-BE49-F238E27FC236}">
-                <a16:creationId xmlns:a16="http://schemas.microsoft.com/office/drawing/2014/main" id="{E3984FE7-48C9-4552-C67C-F4C8F822AEE6}"/>
-              </a:ext>
-            </a:extLst>
-          </p:cNvPr>
-          <p:cNvSpPr txBox="1"/>
-          <p:nvPr/>
-        </p:nvSpPr>
-        <p:spPr>
-          <a:xfrm>
-            <a:off x="6639675" y="3740604"/>
-            <a:ext cx="1431375" cy="430887"/>
-          </a:xfrm>
-          <a:prstGeom prst="rect">
-            <a:avLst/>
-          </a:prstGeom>
-          <a:noFill/>
-        </p:spPr>
-        <p:txBody>
-          <a:bodyPr wrap="square" rtlCol="0">
-            <a:spAutoFit/>
-          </a:bodyPr>
-          <a:lstStyle/>
-          <a:p>
-            <a:r>
-              <a:rPr lang="en-SG" sz="1100" b="1" dirty="0"/>
-              <a:t>Customer’s network topology config  </a:t>
-            </a:r>
-          </a:p>
-        </p:txBody>
-      </p:sp>
-      <p:pic>
-        <p:nvPicPr>
-          <p:cNvPr id="29" name="Picture 4">
-            <a:extLst>
-              <a:ext uri="{FF2B5EF4-FFF2-40B4-BE49-F238E27FC236}">
-                <a16:creationId xmlns:a16="http://schemas.microsoft.com/office/drawing/2014/main" id="{4025A0C5-8B2E-4D35-1F92-CB5121B93DF6}"/>
-              </a:ext>
-            </a:extLst>
-          </p:cNvPr>
-          <p:cNvPicPr>
-            <a:picLocks noChangeAspect="1" noChangeArrowheads="1"/>
-          </p:cNvPicPr>
-          <p:nvPr/>
-        </p:nvPicPr>
-        <p:blipFill>
-          <a:blip r:embed="rId4">
-            <a:extLst>
-              <a:ext uri="{28A0092B-C50C-407E-A947-70E740481C1C}">
-                <a14:useLocalDpi xmlns:a14="http://schemas.microsoft.com/office/drawing/2010/main" val="0"/>
-              </a:ext>
-            </a:extLst>
-          </a:blip>
-          <a:srcRect/>
-          <a:stretch>
-            <a:fillRect/>
-          </a:stretch>
-        </p:blipFill>
-        <p:spPr bwMode="auto">
-          <a:xfrm>
-            <a:off x="11716222" y="5782282"/>
-            <a:ext cx="257116" cy="257116"/>
-          </a:xfrm>
-          <a:prstGeom prst="rect">
-            <a:avLst/>
-          </a:prstGeom>
-          <a:noFill/>
-          <a:extLst>
-            <a:ext uri="{909E8E84-426E-40DD-AFC4-6F175D3DCCD1}">
-              <a14:hiddenFill xmlns:a14="http://schemas.microsoft.com/office/drawing/2010/main">
-                <a:solidFill>
-                  <a:srgbClr val="FFFFFF"/>
-                </a:solidFill>
-              </a14:hiddenFill>
-            </a:ext>
-          </a:extLst>
-        </p:spPr>
-      </p:pic>
-      <p:sp>
-        <p:nvSpPr>
-          <p:cNvPr id="30" name="TextBox 29">
-            <a:extLst>
-              <a:ext uri="{FF2B5EF4-FFF2-40B4-BE49-F238E27FC236}">
-                <a16:creationId xmlns:a16="http://schemas.microsoft.com/office/drawing/2014/main" id="{5C3098D8-744A-B64F-E259-99C2E2301061}"/>
-              </a:ext>
-            </a:extLst>
-          </p:cNvPr>
-          <p:cNvSpPr txBox="1"/>
-          <p:nvPr/>
-        </p:nvSpPr>
-        <p:spPr>
-          <a:xfrm>
-            <a:off x="9997961" y="5696709"/>
-            <a:ext cx="1266806" cy="430887"/>
-          </a:xfrm>
-          <a:prstGeom prst="rect">
-            <a:avLst/>
-          </a:prstGeom>
-          <a:noFill/>
-          <a:ln w="12700">
-            <a:solidFill>
-              <a:schemeClr val="tx1"/>
-            </a:solidFill>
-            <a:prstDash val="sysDash"/>
-          </a:ln>
-        </p:spPr>
-        <p:txBody>
-          <a:bodyPr wrap="square" rtlCol="0">
-            <a:spAutoFit/>
-          </a:bodyPr>
-          <a:lstStyle/>
-          <a:p>
-            <a:r>
-              <a:rPr lang="en-SG" sz="1100" dirty="0"/>
-              <a:t>Monitor and Control hub (Web)</a:t>
-            </a:r>
-          </a:p>
-        </p:txBody>
-      </p:sp>
-      <p:cxnSp>
-        <p:nvCxnSpPr>
-          <p:cNvPr id="31" name="Straight Arrow Connector 30">
-            <a:extLst>
-              <a:ext uri="{FF2B5EF4-FFF2-40B4-BE49-F238E27FC236}">
-                <a16:creationId xmlns:a16="http://schemas.microsoft.com/office/drawing/2014/main" id="{935CC5B0-ABB2-8410-8147-2509C3C3E205}"/>
-              </a:ext>
-            </a:extLst>
-          </p:cNvPr>
-          <p:cNvCxnSpPr>
-            <a:cxnSpLocks/>
-            <a:stCxn id="30" idx="3"/>
-            <a:endCxn id="29" idx="1"/>
-          </p:cNvCxnSpPr>
-          <p:nvPr/>
-        </p:nvCxnSpPr>
-        <p:spPr>
-          <a:xfrm flipV="1">
-            <a:off x="11264767" y="5910840"/>
-            <a:ext cx="451455" cy="1313"/>
-          </a:xfrm>
-          <a:prstGeom prst="straightConnector1">
-            <a:avLst/>
-          </a:prstGeom>
-          <a:ln>
-            <a:solidFill>
-              <a:schemeClr val="accent6">
-                <a:lumMod val="75000"/>
-              </a:schemeClr>
-            </a:solidFill>
-            <a:prstDash val="dash"/>
-            <a:headEnd type="triangle"/>
-            <a:tailEnd type="triangle"/>
-          </a:ln>
-        </p:spPr>
-        <p:style>
-          <a:lnRef idx="1">
-            <a:schemeClr val="accent1"/>
-          </a:lnRef>
-          <a:fillRef idx="0">
-            <a:schemeClr val="accent1"/>
-          </a:fillRef>
-          <a:effectRef idx="0">
-            <a:schemeClr val="accent1"/>
-          </a:effectRef>
-          <a:fontRef idx="minor">
-            <a:schemeClr val="tx1"/>
-          </a:fontRef>
-        </p:style>
-      </p:cxnSp>
-      <p:cxnSp>
-        <p:nvCxnSpPr>
-          <p:cNvPr id="32" name="Straight Arrow Connector 31">
-            <a:extLst>
-              <a:ext uri="{FF2B5EF4-FFF2-40B4-BE49-F238E27FC236}">
-                <a16:creationId xmlns:a16="http://schemas.microsoft.com/office/drawing/2014/main" id="{473D72A0-1110-9BF8-949B-EC07FF6251D5}"/>
-              </a:ext>
-            </a:extLst>
-          </p:cNvPr>
-          <p:cNvCxnSpPr>
-            <a:cxnSpLocks/>
-          </p:cNvCxnSpPr>
-          <p:nvPr/>
-        </p:nvCxnSpPr>
-        <p:spPr>
-          <a:xfrm flipV="1">
-            <a:off x="9548681" y="5910840"/>
-            <a:ext cx="451455" cy="1313"/>
-          </a:xfrm>
-          <a:prstGeom prst="straightConnector1">
-            <a:avLst/>
-          </a:prstGeom>
-          <a:ln>
-            <a:solidFill>
-              <a:schemeClr val="accent6">
-                <a:lumMod val="75000"/>
-              </a:schemeClr>
-            </a:solidFill>
-            <a:prstDash val="dash"/>
-            <a:headEnd type="triangle"/>
-            <a:tailEnd type="triangle"/>
-          </a:ln>
-        </p:spPr>
-        <p:style>
-          <a:lnRef idx="1">
-            <a:schemeClr val="accent1"/>
-          </a:lnRef>
-          <a:fillRef idx="0">
-            <a:schemeClr val="accent1"/>
-          </a:fillRef>
-          <a:effectRef idx="0">
-            <a:schemeClr val="accent1"/>
-          </a:effectRef>
-          <a:fontRef idx="minor">
-            <a:schemeClr val="tx1"/>
-          </a:fontRef>
-        </p:style>
-      </p:cxnSp>
-      <p:sp>
-        <p:nvSpPr>
-          <p:cNvPr id="33" name="TextBox 32">
-            <a:extLst>
-              <a:ext uri="{FF2B5EF4-FFF2-40B4-BE49-F238E27FC236}">
-                <a16:creationId xmlns:a16="http://schemas.microsoft.com/office/drawing/2014/main" id="{A1A62063-23C1-EFB5-3123-FE5D93969BCD}"/>
-              </a:ext>
-            </a:extLst>
-          </p:cNvPr>
-          <p:cNvSpPr txBox="1"/>
-          <p:nvPr/>
-        </p:nvSpPr>
-        <p:spPr>
-          <a:xfrm>
-            <a:off x="6753220" y="894525"/>
-            <a:ext cx="3599930" cy="338554"/>
-          </a:xfrm>
-          <a:prstGeom prst="rect">
-            <a:avLst/>
-          </a:prstGeom>
-          <a:noFill/>
-        </p:spPr>
-        <p:txBody>
-          <a:bodyPr wrap="square" rtlCol="0">
-            <a:spAutoFit/>
-          </a:bodyPr>
-          <a:lstStyle/>
-          <a:p>
-            <a:r>
-              <a:rPr lang="en-US" sz="1600" b="1" dirty="0"/>
-              <a:t>System module diagram </a:t>
-            </a:r>
-            <a:endParaRPr lang="en-SG" sz="1600" b="1" dirty="0"/>
-          </a:p>
-        </p:txBody>
-      </p:sp>
-      <p:sp>
-        <p:nvSpPr>
-          <p:cNvPr id="34" name="TextBox 33">
-            <a:extLst>
-              <a:ext uri="{FF2B5EF4-FFF2-40B4-BE49-F238E27FC236}">
-                <a16:creationId xmlns:a16="http://schemas.microsoft.com/office/drawing/2014/main" id="{D1005488-9C40-65CD-A854-A3BBAF677E36}"/>
-              </a:ext>
-            </a:extLst>
-          </p:cNvPr>
-          <p:cNvSpPr txBox="1"/>
-          <p:nvPr/>
-        </p:nvSpPr>
-        <p:spPr>
-          <a:xfrm>
-            <a:off x="11605376" y="5503173"/>
-            <a:ext cx="533784" cy="261610"/>
-          </a:xfrm>
-          <a:prstGeom prst="rect">
-            <a:avLst/>
-          </a:prstGeom>
-          <a:noFill/>
-        </p:spPr>
-        <p:txBody>
-          <a:bodyPr wrap="square" rtlCol="0">
-            <a:spAutoFit/>
-          </a:bodyPr>
-          <a:lstStyle/>
-          <a:p>
-            <a:r>
-              <a:rPr lang="en-SG" sz="1100" b="1" dirty="0"/>
-              <a:t>User</a:t>
             </a:r>
           </a:p>
         </p:txBody>
@@ -5377,6 +4090,1706 @@
 </file>
 
 <file path=ppt/slides/slide2.xml><?xml version="1.0" encoding="utf-8"?>
+<p:sld xmlns:a="http://schemas.openxmlformats.org/drawingml/2006/main" xmlns:r="http://schemas.openxmlformats.org/officeDocument/2006/relationships" xmlns:p="http://schemas.openxmlformats.org/presentationml/2006/main">
+  <p:cSld>
+    <p:spTree>
+      <p:nvGrpSpPr>
+        <p:cNvPr id="1" name=""/>
+        <p:cNvGrpSpPr/>
+        <p:nvPr/>
+      </p:nvGrpSpPr>
+      <p:grpSpPr>
+        <a:xfrm>
+          <a:off x="0" y="0"/>
+          <a:ext cx="0" cy="0"/>
+          <a:chOff x="0" y="0"/>
+          <a:chExt cx="0" cy="0"/>
+        </a:xfrm>
+      </p:grpSpPr>
+      <p:sp>
+        <p:nvSpPr>
+          <p:cNvPr id="4" name="TextBox 3">
+            <a:extLst>
+              <a:ext uri="{FF2B5EF4-FFF2-40B4-BE49-F238E27FC236}">
+                <a16:creationId xmlns:a16="http://schemas.microsoft.com/office/drawing/2014/main" id="{9C4335D5-0078-1587-DC97-D13ACDE98BEC}"/>
+              </a:ext>
+            </a:extLst>
+          </p:cNvPr>
+          <p:cNvSpPr txBox="1"/>
+          <p:nvPr/>
+        </p:nvSpPr>
+        <p:spPr>
+          <a:xfrm>
+            <a:off x="0" y="-12557"/>
+            <a:ext cx="12191999" cy="461665"/>
+          </a:xfrm>
+          <a:prstGeom prst="rect">
+            <a:avLst/>
+          </a:prstGeom>
+          <a:solidFill>
+            <a:schemeClr val="accent1">
+              <a:lumMod val="75000"/>
+            </a:schemeClr>
+          </a:solidFill>
+          <a:ln>
+            <a:solidFill>
+              <a:schemeClr val="tx1"/>
+            </a:solidFill>
+          </a:ln>
+        </p:spPr>
+        <p:txBody>
+          <a:bodyPr wrap="square" rtlCol="0">
+            <a:spAutoFit/>
+          </a:bodyPr>
+          <a:lstStyle/>
+          <a:p>
+            <a:r>
+              <a:rPr lang="en-SG" sz="2400" dirty="0">
+                <a:solidFill>
+                  <a:schemeClr val="bg1"/>
+                </a:solidFill>
+              </a:rPr>
+              <a:t>Cluster Users Emulator  [ Introduction ] </a:t>
+            </a:r>
+            <a:endParaRPr lang="en-SG" sz="2400" dirty="0">
+              <a:solidFill>
+                <a:srgbClr val="FF0000"/>
+              </a:solidFill>
+            </a:endParaRPr>
+          </a:p>
+        </p:txBody>
+      </p:sp>
+      <p:pic>
+        <p:nvPicPr>
+          <p:cNvPr id="5" name="Picture 4" descr="Graphical user interface, text&#10;&#10;Description automatically generated with medium confidence">
+            <a:extLst>
+              <a:ext uri="{FF2B5EF4-FFF2-40B4-BE49-F238E27FC236}">
+                <a16:creationId xmlns:a16="http://schemas.microsoft.com/office/drawing/2014/main" id="{25E0E093-95E0-5258-C35D-3C788413E876}"/>
+              </a:ext>
+            </a:extLst>
+          </p:cNvPr>
+          <p:cNvPicPr>
+            <a:picLocks noChangeAspect="1"/>
+          </p:cNvPicPr>
+          <p:nvPr/>
+        </p:nvPicPr>
+        <p:blipFill>
+          <a:blip r:embed="rId2">
+            <a:extLst>
+              <a:ext uri="{28A0092B-C50C-407E-A947-70E740481C1C}">
+                <a14:useLocalDpi xmlns:a14="http://schemas.microsoft.com/office/drawing/2010/main" val="0"/>
+              </a:ext>
+            </a:extLst>
+          </a:blip>
+          <a:stretch>
+            <a:fillRect/>
+          </a:stretch>
+        </p:blipFill>
+        <p:spPr>
+          <a:xfrm>
+            <a:off x="10527245" y="53310"/>
+            <a:ext cx="1598494" cy="348275"/>
+          </a:xfrm>
+          <a:prstGeom prst="rect">
+            <a:avLst/>
+          </a:prstGeom>
+        </p:spPr>
+      </p:pic>
+      <p:sp>
+        <p:nvSpPr>
+          <p:cNvPr id="6" name="TextBox 5">
+            <a:extLst>
+              <a:ext uri="{FF2B5EF4-FFF2-40B4-BE49-F238E27FC236}">
+                <a16:creationId xmlns:a16="http://schemas.microsoft.com/office/drawing/2014/main" id="{7264604C-E974-314F-2C60-9796347B0839}"/>
+              </a:ext>
+            </a:extLst>
+          </p:cNvPr>
+          <p:cNvSpPr txBox="1"/>
+          <p:nvPr/>
+        </p:nvSpPr>
+        <p:spPr>
+          <a:xfrm>
+            <a:off x="599149" y="821217"/>
+            <a:ext cx="9280346" cy="5570756"/>
+          </a:xfrm>
+          <a:prstGeom prst="rect">
+            <a:avLst/>
+          </a:prstGeom>
+          <a:noFill/>
+        </p:spPr>
+        <p:txBody>
+          <a:bodyPr wrap="square" rtlCol="0">
+            <a:spAutoFit/>
+          </a:bodyPr>
+          <a:lstStyle/>
+          <a:p>
+            <a:pPr algn="just"/>
+            <a:r>
+              <a:rPr lang="en-US" b="1" dirty="0"/>
+              <a:t>What is Cluster Users Emulator? </a:t>
+            </a:r>
+          </a:p>
+          <a:p>
+            <a:pPr algn="just"/>
+            <a:endParaRPr lang="en-US" sz="1600" b="1" dirty="0"/>
+          </a:p>
+          <a:p>
+            <a:pPr algn="just"/>
+            <a:r>
+              <a:rPr lang="en-US" sz="1600" dirty="0"/>
+              <a:t>The Cluster Users Emulator is a multiple users’ action emulation system running in a network/compute cluster system which can fill the customers’ requirement about:</a:t>
+            </a:r>
+          </a:p>
+          <a:p>
+            <a:pPr algn="just"/>
+            <a:endParaRPr lang="en-US" sz="1600" dirty="0"/>
+          </a:p>
+          <a:p>
+            <a:pPr marL="285750" indent="-285750" algn="just">
+              <a:buFont typeface="Arial" panose="020B0604020202020204" pitchFamily="34" charset="0"/>
+              <a:buChar char="•"/>
+            </a:pPr>
+            <a:r>
+              <a:rPr lang="en-US" sz="1600" dirty="0"/>
+              <a:t>Network-traffic / node activities generation. </a:t>
+            </a:r>
+          </a:p>
+          <a:p>
+            <a:pPr marL="285750" indent="-285750" algn="just">
+              <a:buFont typeface="Arial" panose="020B0604020202020204" pitchFamily="34" charset="0"/>
+              <a:buChar char="•"/>
+            </a:pPr>
+            <a:r>
+              <a:rPr lang="en-US" sz="1600" dirty="0"/>
+              <a:t>Robotic process / tasks automation. </a:t>
+            </a:r>
+          </a:p>
+          <a:p>
+            <a:pPr marL="285750" indent="-285750" algn="just">
+              <a:buFont typeface="Arial" panose="020B0604020202020204" pitchFamily="34" charset="0"/>
+              <a:buChar char="•"/>
+            </a:pPr>
+            <a:r>
+              <a:rPr lang="en-US" sz="1600" dirty="0"/>
+              <a:t>System tasks’ process monitoring and control.</a:t>
+            </a:r>
+          </a:p>
+          <a:p>
+            <a:pPr algn="just"/>
+            <a:endParaRPr lang="en-US" sz="1600" b="1" dirty="0"/>
+          </a:p>
+          <a:p>
+            <a:pPr algn="just"/>
+            <a:endParaRPr lang="en-US" sz="1600" b="1" dirty="0"/>
+          </a:p>
+          <a:p>
+            <a:pPr algn="just"/>
+            <a:r>
+              <a:rPr lang="en-US" b="1" dirty="0"/>
+              <a:t>Program Design Purpose</a:t>
+            </a:r>
+          </a:p>
+          <a:p>
+            <a:pPr algn="just"/>
+            <a:endParaRPr lang="en-US" sz="1600" b="1" dirty="0"/>
+          </a:p>
+          <a:p>
+            <a:pPr algn="just"/>
+            <a:r>
+              <a:rPr lang="en-US" sz="1600" dirty="0"/>
+              <a:t>We want to create a distributed and no-centralized single/multiple users’ activities emulator system to simulate and monitor a mid side cluster of users’ normal network traffic actions and the local activities events. The system can be applied to support below scenario : </a:t>
+            </a:r>
+          </a:p>
+          <a:p>
+            <a:pPr algn="just"/>
+            <a:endParaRPr lang="en-US" sz="1600" dirty="0"/>
+          </a:p>
+          <a:p>
+            <a:pPr marL="285750" indent="-285750" algn="just">
+              <a:buFont typeface="Arial" panose="020B0604020202020204" pitchFamily="34" charset="0"/>
+              <a:buChar char="•"/>
+            </a:pPr>
+            <a:r>
+              <a:rPr lang="en-US" sz="1600" dirty="0"/>
+              <a:t>Auto repeat/replay specified numbers of users (blue team) activities (</a:t>
+            </a:r>
+            <a:r>
+              <a:rPr lang="en-SG" sz="1600" dirty="0"/>
+              <a:t>b</a:t>
+            </a:r>
+            <a:r>
+              <a:rPr lang="en-SG" sz="1600" b="0" i="0" dirty="0">
+                <a:effectLst/>
+              </a:rPr>
+              <a:t>enign-traffic</a:t>
+            </a:r>
+            <a:r>
+              <a:rPr lang="en-US" sz="1600" dirty="0"/>
+              <a:t>) or </a:t>
+            </a:r>
+            <a:r>
+              <a:rPr lang="en-SG" sz="1600" b="0" i="0" dirty="0">
+                <a:effectLst/>
+              </a:rPr>
+              <a:t>or attack-action (red team) </a:t>
+            </a:r>
+            <a:r>
+              <a:rPr lang="en-US" sz="1600" dirty="0"/>
+              <a:t>in cyber exercise event.</a:t>
+            </a:r>
+          </a:p>
+          <a:p>
+            <a:pPr marL="285750" indent="-285750" algn="just">
+              <a:buFont typeface="Arial" panose="020B0604020202020204" pitchFamily="34" charset="0"/>
+              <a:buChar char="•"/>
+            </a:pPr>
+            <a:r>
+              <a:rPr lang="en-US" sz="1600" dirty="0"/>
+              <a:t>Generate required network traffic flow with different network protocols for network security research project. </a:t>
+            </a:r>
+          </a:p>
+          <a:p>
+            <a:pPr marL="285750" indent="-285750" algn="just">
+              <a:buFont typeface="Arial" panose="020B0604020202020204" pitchFamily="34" charset="0"/>
+              <a:buChar char="•"/>
+            </a:pPr>
+            <a:r>
+              <a:rPr lang="en-US" sz="1600" dirty="0"/>
+              <a:t>Be used to build the repeatable users’ test environment for AI/ML trained model’s testing and verification.</a:t>
+            </a:r>
+          </a:p>
+          <a:p>
+            <a:pPr marL="285750" indent="-285750" algn="just">
+              <a:buFont typeface="Arial" panose="020B0604020202020204" pitchFamily="34" charset="0"/>
+              <a:buChar char="•"/>
+            </a:pPr>
+            <a:r>
+              <a:rPr lang="en-US" sz="1600" dirty="0"/>
+              <a:t>Provide library API for customer to build customized complex “Human type” action. </a:t>
+            </a:r>
+          </a:p>
+        </p:txBody>
+      </p:sp>
+    </p:spTree>
+    <p:extLst>
+      <p:ext uri="{BB962C8B-B14F-4D97-AF65-F5344CB8AC3E}">
+        <p14:creationId xmlns:p14="http://schemas.microsoft.com/office/powerpoint/2010/main" val="3433724647"/>
+      </p:ext>
+    </p:extLst>
+  </p:cSld>
+  <p:clrMapOvr>
+    <a:masterClrMapping/>
+  </p:clrMapOvr>
+</p:sld>
+</file>
+
+<file path=ppt/slides/slide3.xml><?xml version="1.0" encoding="utf-8"?>
+<p:sld xmlns:a="http://schemas.openxmlformats.org/drawingml/2006/main" xmlns:r="http://schemas.openxmlformats.org/officeDocument/2006/relationships" xmlns:p="http://schemas.openxmlformats.org/presentationml/2006/main">
+  <p:cSld>
+    <p:spTree>
+      <p:nvGrpSpPr>
+        <p:cNvPr id="1" name=""/>
+        <p:cNvGrpSpPr/>
+        <p:nvPr/>
+      </p:nvGrpSpPr>
+      <p:grpSpPr>
+        <a:xfrm>
+          <a:off x="0" y="0"/>
+          <a:ext cx="0" cy="0"/>
+          <a:chOff x="0" y="0"/>
+          <a:chExt cx="0" cy="0"/>
+        </a:xfrm>
+      </p:grpSpPr>
+      <p:pic>
+        <p:nvPicPr>
+          <p:cNvPr id="51" name="Picture 50">
+            <a:extLst>
+              <a:ext uri="{FF2B5EF4-FFF2-40B4-BE49-F238E27FC236}">
+                <a16:creationId xmlns:a16="http://schemas.microsoft.com/office/drawing/2014/main" id="{70C991E6-EC73-58A9-6ABC-F1FA2ABE4B55}"/>
+              </a:ext>
+            </a:extLst>
+          </p:cNvPr>
+          <p:cNvPicPr>
+            <a:picLocks noChangeAspect="1"/>
+          </p:cNvPicPr>
+          <p:nvPr/>
+        </p:nvPicPr>
+        <p:blipFill>
+          <a:blip r:embed="rId3"/>
+          <a:stretch>
+            <a:fillRect/>
+          </a:stretch>
+        </p:blipFill>
+        <p:spPr>
+          <a:xfrm>
+            <a:off x="6096000" y="1265899"/>
+            <a:ext cx="5734379" cy="5085205"/>
+          </a:xfrm>
+          <a:prstGeom prst="rect">
+            <a:avLst/>
+          </a:prstGeom>
+          <a:ln>
+            <a:solidFill>
+              <a:schemeClr val="tx1"/>
+            </a:solidFill>
+            <a:prstDash val="dash"/>
+          </a:ln>
+        </p:spPr>
+      </p:pic>
+      <p:sp>
+        <p:nvSpPr>
+          <p:cNvPr id="4" name="TextBox 3">
+            <a:extLst>
+              <a:ext uri="{FF2B5EF4-FFF2-40B4-BE49-F238E27FC236}">
+                <a16:creationId xmlns:a16="http://schemas.microsoft.com/office/drawing/2014/main" id="{B2EE9385-272D-78F8-37EF-D7BFBD2E461E}"/>
+              </a:ext>
+            </a:extLst>
+          </p:cNvPr>
+          <p:cNvSpPr txBox="1"/>
+          <p:nvPr/>
+        </p:nvSpPr>
+        <p:spPr>
+          <a:xfrm>
+            <a:off x="0" y="-12557"/>
+            <a:ext cx="12191999" cy="461665"/>
+          </a:xfrm>
+          <a:prstGeom prst="rect">
+            <a:avLst/>
+          </a:prstGeom>
+          <a:solidFill>
+            <a:schemeClr val="accent1">
+              <a:lumMod val="75000"/>
+            </a:schemeClr>
+          </a:solidFill>
+          <a:ln>
+            <a:solidFill>
+              <a:schemeClr val="tx1"/>
+            </a:solidFill>
+          </a:ln>
+        </p:spPr>
+        <p:txBody>
+          <a:bodyPr wrap="square" rtlCol="0">
+            <a:spAutoFit/>
+          </a:bodyPr>
+          <a:lstStyle/>
+          <a:p>
+            <a:r>
+              <a:rPr lang="en-SG" sz="2400" dirty="0">
+                <a:solidFill>
+                  <a:schemeClr val="bg1"/>
+                </a:solidFill>
+              </a:rPr>
+              <a:t>Cluster Users Emulator  [ Introduction ] </a:t>
+            </a:r>
+            <a:endParaRPr lang="en-SG" sz="2400" dirty="0">
+              <a:solidFill>
+                <a:srgbClr val="FF0000"/>
+              </a:solidFill>
+            </a:endParaRPr>
+          </a:p>
+        </p:txBody>
+      </p:sp>
+      <p:pic>
+        <p:nvPicPr>
+          <p:cNvPr id="5" name="Picture 4" descr="Graphical user interface, text&#10;&#10;Description automatically generated with medium confidence">
+            <a:extLst>
+              <a:ext uri="{FF2B5EF4-FFF2-40B4-BE49-F238E27FC236}">
+                <a16:creationId xmlns:a16="http://schemas.microsoft.com/office/drawing/2014/main" id="{CCBDD8B4-58ED-392B-004A-4336DFD8CA6A}"/>
+              </a:ext>
+            </a:extLst>
+          </p:cNvPr>
+          <p:cNvPicPr>
+            <a:picLocks noChangeAspect="1"/>
+          </p:cNvPicPr>
+          <p:nvPr/>
+        </p:nvPicPr>
+        <p:blipFill>
+          <a:blip r:embed="rId4">
+            <a:extLst>
+              <a:ext uri="{28A0092B-C50C-407E-A947-70E740481C1C}">
+                <a14:useLocalDpi xmlns:a14="http://schemas.microsoft.com/office/drawing/2010/main" val="0"/>
+              </a:ext>
+            </a:extLst>
+          </a:blip>
+          <a:stretch>
+            <a:fillRect/>
+          </a:stretch>
+        </p:blipFill>
+        <p:spPr>
+          <a:xfrm>
+            <a:off x="10527245" y="53310"/>
+            <a:ext cx="1598494" cy="348275"/>
+          </a:xfrm>
+          <a:prstGeom prst="rect">
+            <a:avLst/>
+          </a:prstGeom>
+        </p:spPr>
+      </p:pic>
+      <p:sp>
+        <p:nvSpPr>
+          <p:cNvPr id="47" name="TextBox 46">
+            <a:extLst>
+              <a:ext uri="{FF2B5EF4-FFF2-40B4-BE49-F238E27FC236}">
+                <a16:creationId xmlns:a16="http://schemas.microsoft.com/office/drawing/2014/main" id="{927A1C77-2657-A42A-0407-4F6B59F33E79}"/>
+              </a:ext>
+            </a:extLst>
+          </p:cNvPr>
+          <p:cNvSpPr txBox="1"/>
+          <p:nvPr/>
+        </p:nvSpPr>
+        <p:spPr>
+          <a:xfrm>
+            <a:off x="273168" y="849849"/>
+            <a:ext cx="5580980" cy="5786199"/>
+          </a:xfrm>
+          <a:prstGeom prst="rect">
+            <a:avLst/>
+          </a:prstGeom>
+          <a:noFill/>
+        </p:spPr>
+        <p:txBody>
+          <a:bodyPr wrap="square" rtlCol="0">
+            <a:spAutoFit/>
+          </a:bodyPr>
+          <a:lstStyle/>
+          <a:p>
+            <a:r>
+              <a:rPr lang="en-US" b="1" dirty="0"/>
+              <a:t>System Structure</a:t>
+            </a:r>
+          </a:p>
+          <a:p>
+            <a:pPr algn="just"/>
+            <a:endParaRPr lang="en-US" sz="1600" dirty="0"/>
+          </a:p>
+          <a:p>
+            <a:pPr algn="just"/>
+            <a:r>
+              <a:rPr lang="en-US" sz="1600" dirty="0"/>
+              <a:t>The user Emulator system can be deployed on single compute node, real network system, VMs based SDN (software defined network).  The product contents three parts, the “User actions repository”, the “User action emulator/scheduler” and the “scheduler monitor hub”. (The 3 parts relationship is shown in the left system deployment structure diagram)</a:t>
+            </a:r>
+          </a:p>
+          <a:p>
+            <a:pPr algn="just"/>
+            <a:endParaRPr lang="en-US" sz="1600" dirty="0"/>
+          </a:p>
+          <a:p>
+            <a:pPr marL="285750" indent="-285750" algn="just">
+              <a:buFont typeface="Arial" panose="020B0604020202020204" pitchFamily="34" charset="0"/>
+              <a:buChar char="•"/>
+            </a:pPr>
+            <a:r>
+              <a:rPr lang="en-US" sz="1600" b="1" dirty="0"/>
+              <a:t>User Actions Repository </a:t>
+            </a:r>
+            <a:r>
+              <a:rPr lang="en-US" sz="1600" dirty="0"/>
+              <a:t>: Provide the library APIs repository to simulate simple user’s normal activities/events under hardware, network, OS and App level. (Such as starting the online meeting, send/receive email, upload/download files, edit MS-Office doc, On/Off Windows FW, watch online/offline video…)</a:t>
+            </a:r>
+          </a:p>
+          <a:p>
+            <a:pPr marL="285750" indent="-285750" algn="just">
+              <a:buFont typeface="Arial" panose="020B0604020202020204" pitchFamily="34" charset="0"/>
+              <a:buChar char="•"/>
+            </a:pPr>
+            <a:r>
+              <a:rPr lang="en-US" sz="1600" b="1" dirty="0"/>
+              <a:t>User Action Emulator</a:t>
+            </a:r>
+            <a:r>
+              <a:rPr lang="en-US" sz="1600" dirty="0"/>
+              <a:t>: A RPA type scheduler to invoke the action in repository to build more complex “Human type” activities and run the tasks based on the users’ timeline playbook configuration.</a:t>
+            </a:r>
+          </a:p>
+          <a:p>
+            <a:pPr marL="285750" indent="-285750" algn="just">
+              <a:buFont typeface="Arial" panose="020B0604020202020204" pitchFamily="34" charset="0"/>
+              <a:buChar char="•"/>
+            </a:pPr>
+            <a:r>
+              <a:rPr lang="en-US" sz="1600" b="1" dirty="0"/>
+              <a:t>Scheduler Monitor Hub</a:t>
+            </a:r>
+            <a:r>
+              <a:rPr lang="en-US" sz="1600" dirty="0"/>
+              <a:t>: A no-centralized monitor website host which provides plug and play tasks state view function for customer to monitor and control all/parts of their  schedulers in a computers/servers cluster. </a:t>
+            </a:r>
+          </a:p>
+        </p:txBody>
+      </p:sp>
+      <p:sp>
+        <p:nvSpPr>
+          <p:cNvPr id="49" name="TextBox 48">
+            <a:extLst>
+              <a:ext uri="{FF2B5EF4-FFF2-40B4-BE49-F238E27FC236}">
+                <a16:creationId xmlns:a16="http://schemas.microsoft.com/office/drawing/2014/main" id="{039CD2E5-2D39-1473-1F22-81941D98852C}"/>
+              </a:ext>
+            </a:extLst>
+          </p:cNvPr>
+          <p:cNvSpPr txBox="1"/>
+          <p:nvPr/>
+        </p:nvSpPr>
+        <p:spPr>
+          <a:xfrm>
+            <a:off x="5969126" y="906363"/>
+            <a:ext cx="3599930" cy="307777"/>
+          </a:xfrm>
+          <a:prstGeom prst="rect">
+            <a:avLst/>
+          </a:prstGeom>
+          <a:noFill/>
+        </p:spPr>
+        <p:txBody>
+          <a:bodyPr wrap="square" rtlCol="0">
+            <a:spAutoFit/>
+          </a:bodyPr>
+          <a:lstStyle/>
+          <a:p>
+            <a:r>
+              <a:rPr lang="en-US" sz="1400" b="1" dirty="0"/>
+              <a:t>System Deployment Structure Diagram </a:t>
+            </a:r>
+            <a:endParaRPr lang="en-SG" sz="1400" b="1" dirty="0"/>
+          </a:p>
+        </p:txBody>
+      </p:sp>
+    </p:spTree>
+    <p:extLst>
+      <p:ext uri="{BB962C8B-B14F-4D97-AF65-F5344CB8AC3E}">
+        <p14:creationId xmlns:p14="http://schemas.microsoft.com/office/powerpoint/2010/main" val="345079857"/>
+      </p:ext>
+    </p:extLst>
+  </p:cSld>
+  <p:clrMapOvr>
+    <a:masterClrMapping/>
+  </p:clrMapOvr>
+</p:sld>
+</file>
+
+<file path=ppt/slides/slide4.xml><?xml version="1.0" encoding="utf-8"?>
+<p:sld xmlns:a="http://schemas.openxmlformats.org/drawingml/2006/main" xmlns:r="http://schemas.openxmlformats.org/officeDocument/2006/relationships" xmlns:p="http://schemas.openxmlformats.org/presentationml/2006/main">
+  <p:cSld>
+    <p:spTree>
+      <p:nvGrpSpPr>
+        <p:cNvPr id="1" name=""/>
+        <p:cNvGrpSpPr/>
+        <p:nvPr/>
+      </p:nvGrpSpPr>
+      <p:grpSpPr>
+        <a:xfrm>
+          <a:off x="0" y="0"/>
+          <a:ext cx="0" cy="0"/>
+          <a:chOff x="0" y="0"/>
+          <a:chExt cx="0" cy="0"/>
+        </a:xfrm>
+      </p:grpSpPr>
+      <p:sp>
+        <p:nvSpPr>
+          <p:cNvPr id="4" name="TextBox 3">
+            <a:extLst>
+              <a:ext uri="{FF2B5EF4-FFF2-40B4-BE49-F238E27FC236}">
+                <a16:creationId xmlns:a16="http://schemas.microsoft.com/office/drawing/2014/main" id="{7771F21B-5594-3C93-C738-F7AD99E94C8D}"/>
+              </a:ext>
+            </a:extLst>
+          </p:cNvPr>
+          <p:cNvSpPr txBox="1"/>
+          <p:nvPr/>
+        </p:nvSpPr>
+        <p:spPr>
+          <a:xfrm>
+            <a:off x="0" y="-12557"/>
+            <a:ext cx="12191999" cy="461665"/>
+          </a:xfrm>
+          <a:prstGeom prst="rect">
+            <a:avLst/>
+          </a:prstGeom>
+          <a:solidFill>
+            <a:schemeClr val="accent1">
+              <a:lumMod val="75000"/>
+            </a:schemeClr>
+          </a:solidFill>
+          <a:ln>
+            <a:solidFill>
+              <a:schemeClr val="tx1"/>
+            </a:solidFill>
+          </a:ln>
+        </p:spPr>
+        <p:txBody>
+          <a:bodyPr wrap="square" rtlCol="0">
+            <a:spAutoFit/>
+          </a:bodyPr>
+          <a:lstStyle/>
+          <a:p>
+            <a:r>
+              <a:rPr lang="en-SG" sz="2400" dirty="0">
+                <a:solidFill>
+                  <a:schemeClr val="bg1"/>
+                </a:solidFill>
+              </a:rPr>
+              <a:t>Cluster Users Emulator  [ Product overview ] </a:t>
+            </a:r>
+            <a:endParaRPr lang="en-SG" sz="2400" dirty="0">
+              <a:solidFill>
+                <a:srgbClr val="FF0000"/>
+              </a:solidFill>
+            </a:endParaRPr>
+          </a:p>
+        </p:txBody>
+      </p:sp>
+      <p:pic>
+        <p:nvPicPr>
+          <p:cNvPr id="5" name="Picture 4" descr="Graphical user interface, text&#10;&#10;Description automatically generated with medium confidence">
+            <a:extLst>
+              <a:ext uri="{FF2B5EF4-FFF2-40B4-BE49-F238E27FC236}">
+                <a16:creationId xmlns:a16="http://schemas.microsoft.com/office/drawing/2014/main" id="{5A0FED60-9150-4AF2-E43D-9378280F4071}"/>
+              </a:ext>
+            </a:extLst>
+          </p:cNvPr>
+          <p:cNvPicPr>
+            <a:picLocks noChangeAspect="1"/>
+          </p:cNvPicPr>
+          <p:nvPr/>
+        </p:nvPicPr>
+        <p:blipFill>
+          <a:blip r:embed="rId2">
+            <a:extLst>
+              <a:ext uri="{28A0092B-C50C-407E-A947-70E740481C1C}">
+                <a14:useLocalDpi xmlns:a14="http://schemas.microsoft.com/office/drawing/2010/main" val="0"/>
+              </a:ext>
+            </a:extLst>
+          </a:blip>
+          <a:stretch>
+            <a:fillRect/>
+          </a:stretch>
+        </p:blipFill>
+        <p:spPr>
+          <a:xfrm>
+            <a:off x="10527245" y="53310"/>
+            <a:ext cx="1598494" cy="348275"/>
+          </a:xfrm>
+          <a:prstGeom prst="rect">
+            <a:avLst/>
+          </a:prstGeom>
+        </p:spPr>
+      </p:pic>
+      <p:sp>
+        <p:nvSpPr>
+          <p:cNvPr id="6" name="TextBox 5">
+            <a:extLst>
+              <a:ext uri="{FF2B5EF4-FFF2-40B4-BE49-F238E27FC236}">
+                <a16:creationId xmlns:a16="http://schemas.microsoft.com/office/drawing/2014/main" id="{9D16C642-91A9-8348-CCEC-1DC506FC14FD}"/>
+              </a:ext>
+            </a:extLst>
+          </p:cNvPr>
+          <p:cNvSpPr txBox="1"/>
+          <p:nvPr/>
+        </p:nvSpPr>
+        <p:spPr>
+          <a:xfrm>
+            <a:off x="370549" y="629035"/>
+            <a:ext cx="10015842" cy="2062103"/>
+          </a:xfrm>
+          <a:prstGeom prst="rect">
+            <a:avLst/>
+          </a:prstGeom>
+          <a:noFill/>
+        </p:spPr>
+        <p:txBody>
+          <a:bodyPr wrap="square" rtlCol="0">
+            <a:spAutoFit/>
+          </a:bodyPr>
+          <a:lstStyle/>
+          <a:p>
+            <a:pPr algn="just"/>
+            <a:r>
+              <a:rPr lang="en-US" sz="1600" b="1" dirty="0"/>
+              <a:t>Product Overview </a:t>
+            </a:r>
+          </a:p>
+          <a:p>
+            <a:pPr algn="just"/>
+            <a:r>
+              <a:rPr lang="en-US" sz="1600" b="1" dirty="0"/>
+              <a:t> </a:t>
+            </a:r>
+          </a:p>
+          <a:p>
+            <a:pPr algn="just"/>
+            <a:r>
+              <a:rPr lang="en-US" sz="1600" dirty="0"/>
+              <a:t>There are several kinds of well-developed network traffic generators, task scheduler tools and the tasks progress monitors hub in the market. But most of these tools’ functions are very general and don’t cover all the three areas (monitor, management and simulate), so the customer still needs to build their system and do lots of development work. Our Cluster Users Emulator is aimed to provide a packaged all-in-one light solution allow our customer to simulate a groups of different users’ complex human type action, then schedule these event and monitor/control the task without spend much workload to play with several different tools. </a:t>
+            </a:r>
+          </a:p>
+        </p:txBody>
+      </p:sp>
+      <p:graphicFrame>
+        <p:nvGraphicFramePr>
+          <p:cNvPr id="8" name="Table 5">
+            <a:extLst>
+              <a:ext uri="{FF2B5EF4-FFF2-40B4-BE49-F238E27FC236}">
+                <a16:creationId xmlns:a16="http://schemas.microsoft.com/office/drawing/2014/main" id="{1175F86C-AAAA-6731-7A69-46AC06CF4BFE}"/>
+              </a:ext>
+            </a:extLst>
+          </p:cNvPr>
+          <p:cNvGraphicFramePr>
+            <a:graphicFrameLocks noGrp="1"/>
+          </p:cNvGraphicFramePr>
+          <p:nvPr>
+            <p:extLst>
+              <p:ext uri="{D42A27DB-BD31-4B8C-83A1-F6EECF244321}">
+                <p14:modId xmlns:p14="http://schemas.microsoft.com/office/powerpoint/2010/main" val="1096614984"/>
+              </p:ext>
+            </p:extLst>
+          </p:nvPr>
+        </p:nvGraphicFramePr>
+        <p:xfrm>
+          <a:off x="489818" y="2995899"/>
+          <a:ext cx="9777303" cy="3765234"/>
+        </p:xfrm>
+        <a:graphic>
+          <a:graphicData uri="http://schemas.openxmlformats.org/drawingml/2006/table">
+            <a:tbl>
+              <a:tblPr firstRow="1" bandRow="1">
+                <a:tableStyleId>{5C22544A-7EE6-4342-B048-85BDC9FD1C3A}</a:tableStyleId>
+              </a:tblPr>
+              <a:tblGrid>
+                <a:gridCol w="4694455">
+                  <a:extLst>
+                    <a:ext uri="{9D8B030D-6E8A-4147-A177-3AD203B41FA5}">
+                      <a16:colId xmlns:a16="http://schemas.microsoft.com/office/drawing/2014/main" val="4149870345"/>
+                    </a:ext>
+                  </a:extLst>
+                </a:gridCol>
+                <a:gridCol w="5082848">
+                  <a:extLst>
+                    <a:ext uri="{9D8B030D-6E8A-4147-A177-3AD203B41FA5}">
+                      <a16:colId xmlns:a16="http://schemas.microsoft.com/office/drawing/2014/main" val="3730207817"/>
+                    </a:ext>
+                  </a:extLst>
+                </a:gridCol>
+              </a:tblGrid>
+              <a:tr h="2027874">
+                <a:tc>
+                  <a:txBody>
+                    <a:bodyPr/>
+                    <a:lstStyle/>
+                    <a:p>
+                      <a:r>
+                        <a:rPr lang="en-US" sz="1200" dirty="0">
+                          <a:solidFill>
+                            <a:schemeClr val="tx1"/>
+                          </a:solidFill>
+                        </a:rPr>
+                        <a:t>Strengths </a:t>
+                      </a:r>
+                    </a:p>
+                    <a:p>
+                      <a:endParaRPr lang="en-US" sz="1200" dirty="0">
+                        <a:solidFill>
+                          <a:schemeClr val="tx1"/>
+                        </a:solidFill>
+                      </a:endParaRPr>
+                    </a:p>
+                    <a:p>
+                      <a:pPr marL="285750" indent="-285750">
+                        <a:buFont typeface="Arial" panose="020B0604020202020204" pitchFamily="34" charset="0"/>
+                        <a:buChar char="•"/>
+                      </a:pPr>
+                      <a:r>
+                        <a:rPr lang="en-US" sz="1200" b="0" dirty="0">
+                          <a:solidFill>
+                            <a:schemeClr val="tx1"/>
+                          </a:solidFill>
+                        </a:rPr>
+                        <a:t>Provide action emulation, tasks management, monitor and control all-in-one solution. </a:t>
+                      </a:r>
+                    </a:p>
+                    <a:p>
+                      <a:pPr marL="285750" indent="-285750">
+                        <a:buFont typeface="Arial" panose="020B0604020202020204" pitchFamily="34" charset="0"/>
+                        <a:buChar char="•"/>
+                      </a:pPr>
+                      <a:r>
+                        <a:rPr lang="en-US" sz="1200" b="0" dirty="0">
+                          <a:solidFill>
+                            <a:schemeClr val="tx1"/>
+                          </a:solidFill>
+                        </a:rPr>
+                        <a:t>Opensource with fully customized feature redesign flexibility and free.</a:t>
+                      </a:r>
+                    </a:p>
+                    <a:p>
+                      <a:pPr marL="285750" indent="-285750">
+                        <a:buFont typeface="Arial" panose="020B0604020202020204" pitchFamily="34" charset="0"/>
+                        <a:buChar char="•"/>
+                      </a:pPr>
+                      <a:r>
+                        <a:rPr lang="en-US" sz="1200" b="0" dirty="0">
+                          <a:solidFill>
+                            <a:schemeClr val="tx1"/>
+                          </a:solidFill>
+                        </a:rPr>
+                        <a:t>No-centralized monitor feature to reduce system modification complexity.  </a:t>
+                      </a:r>
+                    </a:p>
+                    <a:p>
+                      <a:pPr marL="285750" indent="-285750">
+                        <a:buFont typeface="Arial" panose="020B0604020202020204" pitchFamily="34" charset="0"/>
+                        <a:buChar char="•"/>
+                      </a:pPr>
+                      <a:r>
+                        <a:rPr lang="en-US" sz="1200" b="0" dirty="0">
+                          <a:solidFill>
+                            <a:schemeClr val="tx1"/>
+                          </a:solidFill>
+                        </a:rPr>
+                        <a:t>Windows planform and UI operation action lib. </a:t>
+                      </a:r>
+                    </a:p>
+                    <a:p>
+                      <a:pPr marL="285750" indent="-285750">
+                        <a:buFont typeface="Arial" panose="020B0604020202020204" pitchFamily="34" charset="0"/>
+                        <a:buChar char="•"/>
+                      </a:pPr>
+                      <a:r>
+                        <a:rPr lang="en-US" sz="1200" b="0" dirty="0">
+                          <a:solidFill>
+                            <a:schemeClr val="tx1"/>
+                          </a:solidFill>
+                        </a:rPr>
+                        <a:t>Simulate complex human type activities.</a:t>
+                      </a:r>
+                    </a:p>
+                  </a:txBody>
+                  <a:tcPr>
+                    <a:lnL w="12700" cap="flat" cmpd="sng" algn="ctr">
+                      <a:solidFill>
+                        <a:schemeClr val="tx1"/>
+                      </a:solidFill>
+                      <a:prstDash val="solid"/>
+                      <a:round/>
+                      <a:headEnd type="none" w="med" len="med"/>
+                      <a:tailEnd type="none" w="med" len="med"/>
+                    </a:lnL>
+                    <a:lnR w="12700" cap="flat" cmpd="sng" algn="ctr">
+                      <a:solidFill>
+                        <a:schemeClr val="tx1"/>
+                      </a:solidFill>
+                      <a:prstDash val="solid"/>
+                      <a:round/>
+                      <a:headEnd type="none" w="med" len="med"/>
+                      <a:tailEnd type="none" w="med" len="med"/>
+                    </a:lnR>
+                    <a:lnT w="12700" cap="flat" cmpd="sng" algn="ctr">
+                      <a:solidFill>
+                        <a:schemeClr val="tx1"/>
+                      </a:solidFill>
+                      <a:prstDash val="solid"/>
+                      <a:round/>
+                      <a:headEnd type="none" w="med" len="med"/>
+                      <a:tailEnd type="none" w="med" len="med"/>
+                    </a:lnT>
+                    <a:lnB w="12700" cap="flat" cmpd="sng" algn="ctr">
+                      <a:solidFill>
+                        <a:schemeClr val="tx1"/>
+                      </a:solidFill>
+                      <a:prstDash val="solid"/>
+                      <a:round/>
+                      <a:headEnd type="none" w="med" len="med"/>
+                      <a:tailEnd type="none" w="med" len="med"/>
+                    </a:lnB>
+                    <a:solidFill>
+                      <a:schemeClr val="accent1">
+                        <a:lumMod val="20000"/>
+                        <a:lumOff val="80000"/>
+                      </a:schemeClr>
+                    </a:solidFill>
+                  </a:tcPr>
+                </a:tc>
+                <a:tc>
+                  <a:txBody>
+                    <a:bodyPr/>
+                    <a:lstStyle/>
+                    <a:p>
+                      <a:pPr marL="0" marR="0" lvl="0" indent="0" algn="l" defTabSz="914400" rtl="0" eaLnBrk="1" fontAlgn="auto" latinLnBrk="0" hangingPunct="1">
+                        <a:lnSpc>
+                          <a:spcPct val="100000"/>
+                        </a:lnSpc>
+                        <a:spcBef>
+                          <a:spcPts val="0"/>
+                        </a:spcBef>
+                        <a:spcAft>
+                          <a:spcPts val="0"/>
+                        </a:spcAft>
+                        <a:buClrTx/>
+                        <a:buSzTx/>
+                        <a:buFontTx/>
+                        <a:buNone/>
+                        <a:tabLst/>
+                        <a:defRPr/>
+                      </a:pPr>
+                      <a:r>
+                        <a:rPr lang="en-US" sz="1200" dirty="0">
+                          <a:solidFill>
+                            <a:schemeClr val="tx1"/>
+                          </a:solidFill>
+                        </a:rPr>
+                        <a:t>Weaknesses </a:t>
+                      </a:r>
+                    </a:p>
+                    <a:p>
+                      <a:pPr marL="0" marR="0" lvl="0" indent="0" algn="l" defTabSz="914400" rtl="0" eaLnBrk="1" fontAlgn="auto" latinLnBrk="0" hangingPunct="1">
+                        <a:lnSpc>
+                          <a:spcPct val="100000"/>
+                        </a:lnSpc>
+                        <a:spcBef>
+                          <a:spcPts val="0"/>
+                        </a:spcBef>
+                        <a:spcAft>
+                          <a:spcPts val="0"/>
+                        </a:spcAft>
+                        <a:buClrTx/>
+                        <a:buSzTx/>
+                        <a:buFontTx/>
+                        <a:buNone/>
+                        <a:tabLst/>
+                        <a:defRPr/>
+                      </a:pPr>
+                      <a:endParaRPr lang="en-SG" sz="1200" dirty="0">
+                        <a:solidFill>
+                          <a:schemeClr val="tx1"/>
+                        </a:solidFill>
+                      </a:endParaRPr>
+                    </a:p>
+                    <a:p>
+                      <a:pPr marL="285750" marR="0" lvl="0" indent="-285750" algn="l" defTabSz="914400" rtl="0" eaLnBrk="1" fontAlgn="auto" latinLnBrk="0" hangingPunct="1">
+                        <a:lnSpc>
+                          <a:spcPct val="100000"/>
+                        </a:lnSpc>
+                        <a:spcBef>
+                          <a:spcPts val="0"/>
+                        </a:spcBef>
+                        <a:spcAft>
+                          <a:spcPts val="0"/>
+                        </a:spcAft>
+                        <a:buClrTx/>
+                        <a:buSzTx/>
+                        <a:buFont typeface="Arial" panose="020B0604020202020204" pitchFamily="34" charset="0"/>
+                        <a:buChar char="•"/>
+                        <a:tabLst/>
+                        <a:defRPr/>
+                      </a:pPr>
+                      <a:r>
+                        <a:rPr lang="en-SG" sz="1200" b="0" dirty="0">
+                          <a:solidFill>
+                            <a:schemeClr val="tx1"/>
+                          </a:solidFill>
+                        </a:rPr>
+                        <a:t>Monitor-hub only provides basic tasks control function </a:t>
+                      </a:r>
+                    </a:p>
+                    <a:p>
+                      <a:pPr marL="285750" marR="0" lvl="0" indent="-285750" algn="l" defTabSz="914400" rtl="0" eaLnBrk="1" fontAlgn="auto" latinLnBrk="0" hangingPunct="1">
+                        <a:lnSpc>
+                          <a:spcPct val="100000"/>
+                        </a:lnSpc>
+                        <a:spcBef>
+                          <a:spcPts val="0"/>
+                        </a:spcBef>
+                        <a:spcAft>
+                          <a:spcPts val="0"/>
+                        </a:spcAft>
+                        <a:buClrTx/>
+                        <a:buSzTx/>
+                        <a:buFont typeface="Arial" panose="020B0604020202020204" pitchFamily="34" charset="0"/>
+                        <a:buChar char="•"/>
+                        <a:tabLst/>
+                        <a:defRPr/>
+                      </a:pPr>
+                      <a:r>
+                        <a:rPr lang="en-SG" sz="1200" b="0" dirty="0">
+                          <a:solidFill>
+                            <a:schemeClr val="tx1"/>
+                          </a:solidFill>
+                        </a:rPr>
+                        <a:t>Need to do the customized change based on the server and platform. </a:t>
+                      </a:r>
+                    </a:p>
+                    <a:p>
+                      <a:pPr marL="285750" marR="0" lvl="0" indent="-285750" algn="l" defTabSz="914400" rtl="0" eaLnBrk="1" fontAlgn="auto" latinLnBrk="0" hangingPunct="1">
+                        <a:lnSpc>
+                          <a:spcPct val="100000"/>
+                        </a:lnSpc>
+                        <a:spcBef>
+                          <a:spcPts val="0"/>
+                        </a:spcBef>
+                        <a:spcAft>
+                          <a:spcPts val="0"/>
+                        </a:spcAft>
+                        <a:buClrTx/>
+                        <a:buSzTx/>
+                        <a:buFont typeface="Arial" panose="020B0604020202020204" pitchFamily="34" charset="0"/>
+                        <a:buChar char="•"/>
+                        <a:tabLst/>
+                        <a:defRPr/>
+                      </a:pPr>
+                      <a:r>
+                        <a:rPr lang="en-SG" sz="1200" b="0" dirty="0">
+                          <a:solidFill>
+                            <a:schemeClr val="tx1"/>
+                          </a:solidFill>
+                        </a:rPr>
+                        <a:t>Don’t have task pause/continuous function. </a:t>
+                      </a:r>
+                    </a:p>
+                    <a:p>
+                      <a:pPr marL="285750" marR="0" lvl="0" indent="-285750" algn="l" defTabSz="914400" rtl="0" eaLnBrk="1" fontAlgn="auto" latinLnBrk="0" hangingPunct="1">
+                        <a:lnSpc>
+                          <a:spcPct val="100000"/>
+                        </a:lnSpc>
+                        <a:spcBef>
+                          <a:spcPts val="0"/>
+                        </a:spcBef>
+                        <a:spcAft>
+                          <a:spcPts val="0"/>
+                        </a:spcAft>
+                        <a:buClrTx/>
+                        <a:buSzTx/>
+                        <a:buFont typeface="Arial" panose="020B0604020202020204" pitchFamily="34" charset="0"/>
+                        <a:buChar char="•"/>
+                        <a:tabLst/>
+                        <a:defRPr/>
+                      </a:pPr>
+                      <a:r>
+                        <a:rPr lang="en-SG" sz="1200" b="0" dirty="0">
+                          <a:solidFill>
+                            <a:schemeClr val="tx1"/>
+                          </a:solidFill>
+                        </a:rPr>
+                        <a:t>Some of the features are under development. </a:t>
+                      </a:r>
+                    </a:p>
+                    <a:p>
+                      <a:pPr marL="285750" marR="0" lvl="0" indent="-285750" algn="l" defTabSz="914400" rtl="0" eaLnBrk="1" fontAlgn="auto" latinLnBrk="0" hangingPunct="1">
+                        <a:lnSpc>
+                          <a:spcPct val="100000"/>
+                        </a:lnSpc>
+                        <a:spcBef>
+                          <a:spcPts val="0"/>
+                        </a:spcBef>
+                        <a:spcAft>
+                          <a:spcPts val="0"/>
+                        </a:spcAft>
+                        <a:buClrTx/>
+                        <a:buSzTx/>
+                        <a:buFont typeface="Arial" panose="020B0604020202020204" pitchFamily="34" charset="0"/>
+                        <a:buChar char="•"/>
+                        <a:tabLst/>
+                        <a:defRPr/>
+                      </a:pPr>
+                      <a:r>
+                        <a:rPr lang="en-SG" sz="1200" b="0" dirty="0">
+                          <a:solidFill>
+                            <a:schemeClr val="tx1"/>
+                          </a:solidFill>
+                        </a:rPr>
+                        <a:t>Compare with other mature robotic process automation product in the market, our product still need users have programming knowledge.</a:t>
+                      </a:r>
+                    </a:p>
+                    <a:p>
+                      <a:pPr marL="285750" marR="0" lvl="0" indent="-285750" algn="l" defTabSz="914400" rtl="0" eaLnBrk="1" fontAlgn="auto" latinLnBrk="0" hangingPunct="1">
+                        <a:lnSpc>
+                          <a:spcPct val="100000"/>
+                        </a:lnSpc>
+                        <a:spcBef>
+                          <a:spcPts val="0"/>
+                        </a:spcBef>
+                        <a:spcAft>
+                          <a:spcPts val="0"/>
+                        </a:spcAft>
+                        <a:buClrTx/>
+                        <a:buSzTx/>
+                        <a:buFont typeface="Arial" panose="020B0604020202020204" pitchFamily="34" charset="0"/>
+                        <a:buChar char="•"/>
+                        <a:tabLst/>
+                        <a:defRPr/>
+                      </a:pPr>
+                      <a:endParaRPr lang="en-SG" sz="1200" b="0" dirty="0">
+                        <a:solidFill>
+                          <a:schemeClr val="tx1"/>
+                        </a:solidFill>
+                      </a:endParaRPr>
+                    </a:p>
+                  </a:txBody>
+                  <a:tcPr>
+                    <a:lnL w="12700" cap="flat" cmpd="sng" algn="ctr">
+                      <a:solidFill>
+                        <a:schemeClr val="tx1"/>
+                      </a:solidFill>
+                      <a:prstDash val="solid"/>
+                      <a:round/>
+                      <a:headEnd type="none" w="med" len="med"/>
+                      <a:tailEnd type="none" w="med" len="med"/>
+                    </a:lnL>
+                    <a:lnR w="12700" cap="flat" cmpd="sng" algn="ctr">
+                      <a:solidFill>
+                        <a:schemeClr val="tx1"/>
+                      </a:solidFill>
+                      <a:prstDash val="solid"/>
+                      <a:round/>
+                      <a:headEnd type="none" w="med" len="med"/>
+                      <a:tailEnd type="none" w="med" len="med"/>
+                    </a:lnR>
+                    <a:lnT w="12700" cap="flat" cmpd="sng" algn="ctr">
+                      <a:solidFill>
+                        <a:schemeClr val="tx1"/>
+                      </a:solidFill>
+                      <a:prstDash val="solid"/>
+                      <a:round/>
+                      <a:headEnd type="none" w="med" len="med"/>
+                      <a:tailEnd type="none" w="med" len="med"/>
+                    </a:lnT>
+                    <a:lnB w="12700" cap="flat" cmpd="sng" algn="ctr">
+                      <a:solidFill>
+                        <a:schemeClr val="tx1"/>
+                      </a:solidFill>
+                      <a:prstDash val="solid"/>
+                      <a:round/>
+                      <a:headEnd type="none" w="med" len="med"/>
+                      <a:tailEnd type="none" w="med" len="med"/>
+                    </a:lnB>
+                    <a:solidFill>
+                      <a:schemeClr val="accent2">
+                        <a:lumMod val="40000"/>
+                        <a:lumOff val="60000"/>
+                      </a:schemeClr>
+                    </a:solidFill>
+                  </a:tcPr>
+                </a:tc>
+                <a:extLst>
+                  <a:ext uri="{0D108BD9-81ED-4DB2-BD59-A6C34878D82A}">
+                    <a16:rowId xmlns:a16="http://schemas.microsoft.com/office/drawing/2014/main" val="2634739533"/>
+                  </a:ext>
+                </a:extLst>
+              </a:tr>
+              <a:tr h="1675201">
+                <a:tc>
+                  <a:txBody>
+                    <a:bodyPr/>
+                    <a:lstStyle/>
+                    <a:p>
+                      <a:r>
+                        <a:rPr lang="en-SG" sz="1200" b="1" dirty="0"/>
+                        <a:t>Opportunities</a:t>
+                      </a:r>
+                    </a:p>
+                    <a:p>
+                      <a:endParaRPr lang="en-SG" sz="1200" b="1" dirty="0"/>
+                    </a:p>
+                    <a:p>
+                      <a:pPr marL="285750" indent="-285750">
+                        <a:buFont typeface="Arial" panose="020B0604020202020204" pitchFamily="34" charset="0"/>
+                        <a:buChar char="•"/>
+                      </a:pPr>
+                      <a:r>
+                        <a:rPr lang="en-SG" sz="1200" b="0" dirty="0"/>
+                        <a:t>Free for the researchers to add their algo in the platform. </a:t>
+                      </a:r>
+                    </a:p>
+                    <a:p>
+                      <a:pPr marL="285750" indent="-285750">
+                        <a:buFont typeface="Arial" panose="020B0604020202020204" pitchFamily="34" charset="0"/>
+                        <a:buChar char="•"/>
+                      </a:pPr>
+                      <a:r>
+                        <a:rPr lang="en-SG" sz="1200" b="0" dirty="0"/>
+                        <a:t>Avoid customers to spend time to fix the compatible problem among different programming language, platform and license issue. </a:t>
+                      </a:r>
+                    </a:p>
+                    <a:p>
+                      <a:pPr marL="285750" indent="-285750">
+                        <a:buFont typeface="Arial" panose="020B0604020202020204" pitchFamily="34" charset="0"/>
+                        <a:buChar char="•"/>
+                      </a:pPr>
+                      <a:r>
+                        <a:rPr lang="en-SG" sz="1200" b="0" dirty="0"/>
+                        <a:t>Provide more action emulation features for the MS-windows customer and the customer with UI operation request.</a:t>
+                      </a:r>
+                    </a:p>
+                    <a:p>
+                      <a:pPr marL="285750" indent="-285750">
+                        <a:buFont typeface="Arial" panose="020B0604020202020204" pitchFamily="34" charset="0"/>
+                        <a:buChar char="•"/>
+                      </a:pPr>
+                      <a:r>
+                        <a:rPr lang="en-SG" sz="1200" b="0" dirty="0"/>
+                        <a:t>Can also used to simulate different teams’ attack and defence action in cyber exercise . </a:t>
+                      </a:r>
+                    </a:p>
+                  </a:txBody>
+                  <a:tcPr>
+                    <a:lnL w="12700" cap="flat" cmpd="sng" algn="ctr">
+                      <a:solidFill>
+                        <a:schemeClr val="tx1"/>
+                      </a:solidFill>
+                      <a:prstDash val="solid"/>
+                      <a:round/>
+                      <a:headEnd type="none" w="med" len="med"/>
+                      <a:tailEnd type="none" w="med" len="med"/>
+                    </a:lnL>
+                    <a:lnR w="12700" cap="flat" cmpd="sng" algn="ctr">
+                      <a:solidFill>
+                        <a:schemeClr val="tx1"/>
+                      </a:solidFill>
+                      <a:prstDash val="solid"/>
+                      <a:round/>
+                      <a:headEnd type="none" w="med" len="med"/>
+                      <a:tailEnd type="none" w="med" len="med"/>
+                    </a:lnR>
+                    <a:lnT w="12700" cap="flat" cmpd="sng" algn="ctr">
+                      <a:solidFill>
+                        <a:schemeClr val="tx1"/>
+                      </a:solidFill>
+                      <a:prstDash val="solid"/>
+                      <a:round/>
+                      <a:headEnd type="none" w="med" len="med"/>
+                      <a:tailEnd type="none" w="med" len="med"/>
+                    </a:lnT>
+                    <a:lnB w="12700" cap="flat" cmpd="sng" algn="ctr">
+                      <a:solidFill>
+                        <a:schemeClr val="tx1"/>
+                      </a:solidFill>
+                      <a:prstDash val="solid"/>
+                      <a:round/>
+                      <a:headEnd type="none" w="med" len="med"/>
+                      <a:tailEnd type="none" w="med" len="med"/>
+                    </a:lnB>
+                    <a:solidFill>
+                      <a:schemeClr val="accent6">
+                        <a:lumMod val="40000"/>
+                        <a:lumOff val="60000"/>
+                      </a:schemeClr>
+                    </a:solidFill>
+                  </a:tcPr>
+                </a:tc>
+                <a:tc>
+                  <a:txBody>
+                    <a:bodyPr/>
+                    <a:lstStyle/>
+                    <a:p>
+                      <a:r>
+                        <a:rPr lang="en-SG" sz="1200" b="1" dirty="0"/>
+                        <a:t>Threats</a:t>
+                      </a:r>
+                    </a:p>
+                    <a:p>
+                      <a:endParaRPr lang="en-SG" sz="1200" b="1" dirty="0"/>
+                    </a:p>
+                    <a:p>
+                      <a:r>
+                        <a:rPr lang="en-SG" sz="1200" b="1" dirty="0"/>
+                        <a:t>Several Cluster task management tools: </a:t>
+                      </a:r>
+                    </a:p>
+                    <a:p>
+                      <a:pPr marL="285750" indent="-285750">
+                        <a:buFont typeface="Arial" panose="020B0604020202020204" pitchFamily="34" charset="0"/>
+                        <a:buChar char="•"/>
+                      </a:pPr>
+                      <a:r>
+                        <a:rPr lang="en-SG" sz="1200" b="0" dirty="0"/>
+                        <a:t>Airflow (Linux)</a:t>
+                      </a:r>
+                    </a:p>
+                    <a:p>
+                      <a:pPr marL="285750" indent="-285750">
+                        <a:buFont typeface="Arial" panose="020B0604020202020204" pitchFamily="34" charset="0"/>
+                        <a:buChar char="•"/>
+                      </a:pPr>
+                      <a:r>
+                        <a:rPr lang="en-SG" sz="1200" b="0" dirty="0"/>
+                        <a:t>PM2 (Linux)</a:t>
+                      </a:r>
+                    </a:p>
+                    <a:p>
+                      <a:pPr marL="285750" indent="-285750">
+                        <a:buFont typeface="Arial" panose="020B0604020202020204" pitchFamily="34" charset="0"/>
+                        <a:buChar char="•"/>
+                      </a:pPr>
+                      <a:r>
+                        <a:rPr lang="en-SG" sz="1200" b="0" dirty="0"/>
+                        <a:t>Rancher-hub (K8s)</a:t>
+                      </a:r>
+                    </a:p>
+                  </a:txBody>
+                  <a:tcPr>
+                    <a:lnL w="12700" cap="flat" cmpd="sng" algn="ctr">
+                      <a:solidFill>
+                        <a:schemeClr val="tx1"/>
+                      </a:solidFill>
+                      <a:prstDash val="solid"/>
+                      <a:round/>
+                      <a:headEnd type="none" w="med" len="med"/>
+                      <a:tailEnd type="none" w="med" len="med"/>
+                    </a:lnL>
+                    <a:lnR w="12700" cap="flat" cmpd="sng" algn="ctr">
+                      <a:solidFill>
+                        <a:schemeClr val="tx1"/>
+                      </a:solidFill>
+                      <a:prstDash val="solid"/>
+                      <a:round/>
+                      <a:headEnd type="none" w="med" len="med"/>
+                      <a:tailEnd type="none" w="med" len="med"/>
+                    </a:lnR>
+                    <a:lnT w="12700" cap="flat" cmpd="sng" algn="ctr">
+                      <a:solidFill>
+                        <a:schemeClr val="tx1"/>
+                      </a:solidFill>
+                      <a:prstDash val="solid"/>
+                      <a:round/>
+                      <a:headEnd type="none" w="med" len="med"/>
+                      <a:tailEnd type="none" w="med" len="med"/>
+                    </a:lnT>
+                    <a:lnB w="12700" cap="flat" cmpd="sng" algn="ctr">
+                      <a:solidFill>
+                        <a:schemeClr val="tx1"/>
+                      </a:solidFill>
+                      <a:prstDash val="solid"/>
+                      <a:round/>
+                      <a:headEnd type="none" w="med" len="med"/>
+                      <a:tailEnd type="none" w="med" len="med"/>
+                    </a:lnB>
+                    <a:solidFill>
+                      <a:schemeClr val="accent4">
+                        <a:lumMod val="40000"/>
+                        <a:lumOff val="60000"/>
+                      </a:schemeClr>
+                    </a:solidFill>
+                  </a:tcPr>
+                </a:tc>
+                <a:extLst>
+                  <a:ext uri="{0D108BD9-81ED-4DB2-BD59-A6C34878D82A}">
+                    <a16:rowId xmlns:a16="http://schemas.microsoft.com/office/drawing/2014/main" val="630623173"/>
+                  </a:ext>
+                </a:extLst>
+              </a:tr>
+            </a:tbl>
+          </a:graphicData>
+        </a:graphic>
+      </p:graphicFrame>
+      <p:sp>
+        <p:nvSpPr>
+          <p:cNvPr id="10" name="TextBox 9">
+            <a:extLst>
+              <a:ext uri="{FF2B5EF4-FFF2-40B4-BE49-F238E27FC236}">
+                <a16:creationId xmlns:a16="http://schemas.microsoft.com/office/drawing/2014/main" id="{66A0348F-4908-C82D-0A95-0008B24CFD46}"/>
+              </a:ext>
+            </a:extLst>
+          </p:cNvPr>
+          <p:cNvSpPr txBox="1"/>
+          <p:nvPr/>
+        </p:nvSpPr>
+        <p:spPr>
+          <a:xfrm>
+            <a:off x="370549" y="2691138"/>
+            <a:ext cx="3599930" cy="338554"/>
+          </a:xfrm>
+          <a:prstGeom prst="rect">
+            <a:avLst/>
+          </a:prstGeom>
+          <a:noFill/>
+        </p:spPr>
+        <p:txBody>
+          <a:bodyPr wrap="square" rtlCol="0">
+            <a:spAutoFit/>
+          </a:bodyPr>
+          <a:lstStyle/>
+          <a:p>
+            <a:r>
+              <a:rPr lang="en-US" sz="1600" b="1" dirty="0"/>
+              <a:t>SWOT Business Analysis</a:t>
+            </a:r>
+            <a:endParaRPr lang="en-SG" sz="1600" b="1" dirty="0"/>
+          </a:p>
+        </p:txBody>
+      </p:sp>
+    </p:spTree>
+    <p:extLst>
+      <p:ext uri="{BB962C8B-B14F-4D97-AF65-F5344CB8AC3E}">
+        <p14:creationId xmlns:p14="http://schemas.microsoft.com/office/powerpoint/2010/main" val="3749928369"/>
+      </p:ext>
+    </p:extLst>
+  </p:cSld>
+  <p:clrMapOvr>
+    <a:masterClrMapping/>
+  </p:clrMapOvr>
+</p:sld>
+</file>
+
+<file path=ppt/slides/slide5.xml><?xml version="1.0" encoding="utf-8"?>
+<p:sld xmlns:a="http://schemas.openxmlformats.org/drawingml/2006/main" xmlns:r="http://schemas.openxmlformats.org/officeDocument/2006/relationships" xmlns:p="http://schemas.openxmlformats.org/presentationml/2006/main">
+  <p:cSld>
+    <p:spTree>
+      <p:nvGrpSpPr>
+        <p:cNvPr id="1" name=""/>
+        <p:cNvGrpSpPr/>
+        <p:nvPr/>
+      </p:nvGrpSpPr>
+      <p:grpSpPr>
+        <a:xfrm>
+          <a:off x="0" y="0"/>
+          <a:ext cx="0" cy="0"/>
+          <a:chOff x="0" y="0"/>
+          <a:chExt cx="0" cy="0"/>
+        </a:xfrm>
+      </p:grpSpPr>
+      <p:sp>
+        <p:nvSpPr>
+          <p:cNvPr id="4" name="TextBox 3">
+            <a:extLst>
+              <a:ext uri="{FF2B5EF4-FFF2-40B4-BE49-F238E27FC236}">
+                <a16:creationId xmlns:a16="http://schemas.microsoft.com/office/drawing/2014/main" id="{7771F21B-5594-3C93-C738-F7AD99E94C8D}"/>
+              </a:ext>
+            </a:extLst>
+          </p:cNvPr>
+          <p:cNvSpPr txBox="1"/>
+          <p:nvPr/>
+        </p:nvSpPr>
+        <p:spPr>
+          <a:xfrm>
+            <a:off x="0" y="-12557"/>
+            <a:ext cx="12191999" cy="461665"/>
+          </a:xfrm>
+          <a:prstGeom prst="rect">
+            <a:avLst/>
+          </a:prstGeom>
+          <a:solidFill>
+            <a:schemeClr val="accent1">
+              <a:lumMod val="75000"/>
+            </a:schemeClr>
+          </a:solidFill>
+          <a:ln>
+            <a:solidFill>
+              <a:schemeClr val="tx1"/>
+            </a:solidFill>
+          </a:ln>
+        </p:spPr>
+        <p:txBody>
+          <a:bodyPr wrap="square" rtlCol="0">
+            <a:spAutoFit/>
+          </a:bodyPr>
+          <a:lstStyle/>
+          <a:p>
+            <a:r>
+              <a:rPr lang="en-SG" sz="2400" dirty="0">
+                <a:solidFill>
+                  <a:schemeClr val="bg1"/>
+                </a:solidFill>
+              </a:rPr>
+              <a:t>Cluster Users Emulator  [ Product overview ] </a:t>
+            </a:r>
+            <a:endParaRPr lang="en-SG" sz="2400" dirty="0">
+              <a:solidFill>
+                <a:srgbClr val="FF0000"/>
+              </a:solidFill>
+            </a:endParaRPr>
+          </a:p>
+        </p:txBody>
+      </p:sp>
+      <p:pic>
+        <p:nvPicPr>
+          <p:cNvPr id="5" name="Picture 4" descr="Graphical user interface, text&#10;&#10;Description automatically generated with medium confidence">
+            <a:extLst>
+              <a:ext uri="{FF2B5EF4-FFF2-40B4-BE49-F238E27FC236}">
+                <a16:creationId xmlns:a16="http://schemas.microsoft.com/office/drawing/2014/main" id="{5A0FED60-9150-4AF2-E43D-9378280F4071}"/>
+              </a:ext>
+            </a:extLst>
+          </p:cNvPr>
+          <p:cNvPicPr>
+            <a:picLocks noChangeAspect="1"/>
+          </p:cNvPicPr>
+          <p:nvPr/>
+        </p:nvPicPr>
+        <p:blipFill>
+          <a:blip r:embed="rId2">
+            <a:extLst>
+              <a:ext uri="{28A0092B-C50C-407E-A947-70E740481C1C}">
+                <a14:useLocalDpi xmlns:a14="http://schemas.microsoft.com/office/drawing/2010/main" val="0"/>
+              </a:ext>
+            </a:extLst>
+          </a:blip>
+          <a:stretch>
+            <a:fillRect/>
+          </a:stretch>
+        </p:blipFill>
+        <p:spPr>
+          <a:xfrm>
+            <a:off x="10527245" y="53310"/>
+            <a:ext cx="1598494" cy="348275"/>
+          </a:xfrm>
+          <a:prstGeom prst="rect">
+            <a:avLst/>
+          </a:prstGeom>
+        </p:spPr>
+      </p:pic>
+      <p:sp>
+        <p:nvSpPr>
+          <p:cNvPr id="6" name="TextBox 5">
+            <a:extLst>
+              <a:ext uri="{FF2B5EF4-FFF2-40B4-BE49-F238E27FC236}">
+                <a16:creationId xmlns:a16="http://schemas.microsoft.com/office/drawing/2014/main" id="{9D16C642-91A9-8348-CCEC-1DC506FC14FD}"/>
+              </a:ext>
+            </a:extLst>
+          </p:cNvPr>
+          <p:cNvSpPr txBox="1"/>
+          <p:nvPr/>
+        </p:nvSpPr>
+        <p:spPr>
+          <a:xfrm>
+            <a:off x="281097" y="876478"/>
+            <a:ext cx="11629806" cy="2462213"/>
+          </a:xfrm>
+          <a:prstGeom prst="rect">
+            <a:avLst/>
+          </a:prstGeom>
+          <a:noFill/>
+        </p:spPr>
+        <p:txBody>
+          <a:bodyPr wrap="square" rtlCol="0">
+            <a:spAutoFit/>
+          </a:bodyPr>
+          <a:lstStyle/>
+          <a:p>
+            <a:pPr algn="just"/>
+            <a:r>
+              <a:rPr lang="en-US" sz="1400" b="1" dirty="0"/>
+              <a:t>Who may be interested about using it: </a:t>
+            </a:r>
+          </a:p>
+          <a:p>
+            <a:pPr algn="just"/>
+            <a:endParaRPr lang="en-US" sz="1400" b="1" dirty="0"/>
+          </a:p>
+          <a:p>
+            <a:pPr algn="just"/>
+            <a:r>
+              <a:rPr lang="en-US" sz="1400" b="1" dirty="0"/>
+              <a:t>Customer who’s system config and requirement are keep updating   </a:t>
+            </a:r>
+          </a:p>
+          <a:p>
+            <a:pPr algn="just"/>
+            <a:endParaRPr lang="en-US" sz="1400" b="1" dirty="0"/>
+          </a:p>
+          <a:p>
+            <a:pPr algn="just"/>
+            <a:endParaRPr lang="en-US" sz="1400" b="1" dirty="0"/>
+          </a:p>
+          <a:p>
+            <a:pPr algn="just"/>
+            <a:endParaRPr lang="en-US" sz="1400" b="1" dirty="0"/>
+          </a:p>
+          <a:p>
+            <a:pPr algn="just"/>
+            <a:endParaRPr lang="en-US" sz="1400" b="1" dirty="0"/>
+          </a:p>
+          <a:p>
+            <a:pPr algn="just"/>
+            <a:endParaRPr lang="en-US" sz="1400" b="1" dirty="0"/>
+          </a:p>
+          <a:p>
+            <a:pPr algn="just"/>
+            <a:endParaRPr lang="en-US" sz="1400" b="1" dirty="0"/>
+          </a:p>
+          <a:p>
+            <a:pPr algn="just"/>
+            <a:endParaRPr lang="en-US" sz="1400" b="1" dirty="0"/>
+          </a:p>
+          <a:p>
+            <a:pPr algn="just"/>
+            <a:r>
+              <a:rPr lang="en-US" sz="1400" dirty="0"/>
+              <a:t> </a:t>
+            </a:r>
+          </a:p>
+        </p:txBody>
+      </p:sp>
+      <p:sp>
+        <p:nvSpPr>
+          <p:cNvPr id="9" name="TextBox 8">
+            <a:extLst>
+              <a:ext uri="{FF2B5EF4-FFF2-40B4-BE49-F238E27FC236}">
+                <a16:creationId xmlns:a16="http://schemas.microsoft.com/office/drawing/2014/main" id="{CBED0AED-F398-BF63-86FD-DE7214483296}"/>
+              </a:ext>
+            </a:extLst>
+          </p:cNvPr>
+          <p:cNvSpPr txBox="1"/>
+          <p:nvPr/>
+        </p:nvSpPr>
+        <p:spPr>
+          <a:xfrm>
+            <a:off x="281097" y="4076361"/>
+            <a:ext cx="11327807" cy="769441"/>
+          </a:xfrm>
+          <a:prstGeom prst="rect">
+            <a:avLst/>
+          </a:prstGeom>
+          <a:noFill/>
+        </p:spPr>
+        <p:txBody>
+          <a:bodyPr wrap="square" rtlCol="0">
+            <a:spAutoFit/>
+          </a:bodyPr>
+          <a:lstStyle/>
+          <a:p>
+            <a:pPr algn="just"/>
+            <a:r>
+              <a:rPr lang="en-US" sz="1600" b="1" dirty="0"/>
+              <a:t>User Action emulator demo video: </a:t>
+            </a:r>
+          </a:p>
+          <a:p>
+            <a:pPr marL="285750" indent="-285750" algn="just">
+              <a:buFont typeface="Arial" panose="020B0604020202020204" pitchFamily="34" charset="0"/>
+              <a:buChar char="•"/>
+            </a:pPr>
+            <a:r>
+              <a:rPr lang="en-US" sz="1400" dirty="0">
+                <a:hlinkClick r:id="rId3"/>
+              </a:rPr>
+              <a:t>https://www.youtube.com/watch?v=jgm3gQhzUq4&amp;t=57s</a:t>
+            </a:r>
+            <a:endParaRPr lang="en-US" sz="1400" dirty="0"/>
+          </a:p>
+          <a:p>
+            <a:pPr marL="285750" indent="-285750" algn="just">
+              <a:buFont typeface="Arial" panose="020B0604020202020204" pitchFamily="34" charset="0"/>
+              <a:buChar char="•"/>
+            </a:pPr>
+            <a:r>
+              <a:rPr lang="en-US" sz="1400" dirty="0">
+                <a:hlinkClick r:id="rId4"/>
+              </a:rPr>
+              <a:t>https://www.youtube.com/watch?v=wZsRmYPcPTQ</a:t>
+            </a:r>
+            <a:endParaRPr lang="en-US" sz="1400" dirty="0"/>
+          </a:p>
+        </p:txBody>
+      </p:sp>
+    </p:spTree>
+    <p:extLst>
+      <p:ext uri="{BB962C8B-B14F-4D97-AF65-F5344CB8AC3E}">
+        <p14:creationId xmlns:p14="http://schemas.microsoft.com/office/powerpoint/2010/main" val="4084412219"/>
+      </p:ext>
+    </p:extLst>
+  </p:cSld>
+  <p:clrMapOvr>
+    <a:masterClrMapping/>
+  </p:clrMapOvr>
+</p:sld>
+</file>
+
+<file path=ppt/slides/slide6.xml><?xml version="1.0" encoding="utf-8"?>
 <p:sld xmlns:a="http://schemas.openxmlformats.org/drawingml/2006/main" xmlns:r="http://schemas.openxmlformats.org/officeDocument/2006/relationships" xmlns:p="http://schemas.openxmlformats.org/presentationml/2006/main">
   <p:cSld>
     <p:spTree>
@@ -8146,7 +8559,7 @@
 </p:sld>
 </file>
 
-<file path=ppt/slides/slide3.xml><?xml version="1.0" encoding="utf-8"?>
+<file path=ppt/slides/slide7.xml><?xml version="1.0" encoding="utf-8"?>
 <p:sld xmlns:a="http://schemas.openxmlformats.org/drawingml/2006/main" xmlns:r="http://schemas.openxmlformats.org/officeDocument/2006/relationships" xmlns:p="http://schemas.openxmlformats.org/presentationml/2006/main">
   <p:cSld>
     <p:spTree>
@@ -10933,7 +11346,7 @@
 </p:sld>
 </file>
 
-<file path=ppt/slides/slide4.xml><?xml version="1.0" encoding="utf-8"?>
+<file path=ppt/slides/slide8.xml><?xml version="1.0" encoding="utf-8"?>
 <p:sld xmlns:a="http://schemas.openxmlformats.org/drawingml/2006/main" xmlns:r="http://schemas.openxmlformats.org/officeDocument/2006/relationships" xmlns:p="http://schemas.openxmlformats.org/presentationml/2006/main">
   <p:cSld>
     <p:spTree>

</xml_diff>

<commit_message>
move the files to actionScheduler folder.
</commit_message>
<xml_diff>
--- a/doc/User_Action_Emulator_Design_Doc.pptx
+++ b/doc/User_Action_Emulator_Design_Doc.pptx
@@ -625,6 +625,90 @@
           <a:p>
             <a:fld id="{3B0C630E-0CE8-4915-8E08-22247CA7F11A}" type="slidenum">
               <a:rPr lang="en-SG" smtClean="0"/>
+              <a:t>5</a:t>
+            </a:fld>
+            <a:endParaRPr lang="en-SG" dirty="0"/>
+          </a:p>
+        </p:txBody>
+      </p:sp>
+    </p:spTree>
+    <p:extLst>
+      <p:ext uri="{BB962C8B-B14F-4D97-AF65-F5344CB8AC3E}">
+        <p14:creationId xmlns:p14="http://schemas.microsoft.com/office/powerpoint/2010/main" val="3814606933"/>
+      </p:ext>
+    </p:extLst>
+  </p:cSld>
+  <p:clrMapOvr>
+    <a:masterClrMapping/>
+  </p:clrMapOvr>
+</p:notes>
+</file>
+
+<file path=ppt/notesSlides/notesSlide3.xml><?xml version="1.0" encoding="utf-8"?>
+<p:notes xmlns:a="http://schemas.openxmlformats.org/drawingml/2006/main" xmlns:r="http://schemas.openxmlformats.org/officeDocument/2006/relationships" xmlns:p="http://schemas.openxmlformats.org/presentationml/2006/main">
+  <p:cSld>
+    <p:spTree>
+      <p:nvGrpSpPr>
+        <p:cNvPr id="1" name=""/>
+        <p:cNvGrpSpPr/>
+        <p:nvPr/>
+      </p:nvGrpSpPr>
+      <p:grpSpPr>
+        <a:xfrm>
+          <a:off x="0" y="0"/>
+          <a:ext cx="0" cy="0"/>
+          <a:chOff x="0" y="0"/>
+          <a:chExt cx="0" cy="0"/>
+        </a:xfrm>
+      </p:grpSpPr>
+      <p:sp>
+        <p:nvSpPr>
+          <p:cNvPr id="2" name="Slide Image Placeholder 1"/>
+          <p:cNvSpPr>
+            <a:spLocks noGrp="1" noRot="1" noChangeAspect="1"/>
+          </p:cNvSpPr>
+          <p:nvPr>
+            <p:ph type="sldImg"/>
+          </p:nvPr>
+        </p:nvSpPr>
+        <p:spPr/>
+      </p:sp>
+      <p:sp>
+        <p:nvSpPr>
+          <p:cNvPr id="3" name="Notes Placeholder 2"/>
+          <p:cNvSpPr>
+            <a:spLocks noGrp="1"/>
+          </p:cNvSpPr>
+          <p:nvPr>
+            <p:ph type="body" idx="1"/>
+          </p:nvPr>
+        </p:nvSpPr>
+        <p:spPr/>
+        <p:txBody>
+          <a:bodyPr/>
+          <a:lstStyle/>
+          <a:p>
+            <a:endParaRPr lang="en-SG" dirty="0"/>
+          </a:p>
+        </p:txBody>
+      </p:sp>
+      <p:sp>
+        <p:nvSpPr>
+          <p:cNvPr id="4" name="Slide Number Placeholder 3"/>
+          <p:cNvSpPr>
+            <a:spLocks noGrp="1"/>
+          </p:cNvSpPr>
+          <p:nvPr>
+            <p:ph type="sldNum" sz="quarter" idx="5"/>
+          </p:nvPr>
+        </p:nvSpPr>
+        <p:spPr/>
+        <p:txBody>
+          <a:bodyPr/>
+          <a:lstStyle/>
+          <a:p>
+            <a:fld id="{3B0C630E-0CE8-4915-8E08-22247CA7F11A}" type="slidenum">
+              <a:rPr lang="en-SG" smtClean="0"/>
               <a:t>9</a:t>
             </a:fld>
             <a:endParaRPr lang="en-SG" dirty="0"/>
@@ -644,7 +728,7 @@
 </p:notes>
 </file>
 
-<file path=ppt/notesSlides/notesSlide3.xml><?xml version="1.0" encoding="utf-8"?>
+<file path=ppt/notesSlides/notesSlide4.xml><?xml version="1.0" encoding="utf-8"?>
 <p:notes xmlns:a="http://schemas.openxmlformats.org/drawingml/2006/main" xmlns:r="http://schemas.openxmlformats.org/officeDocument/2006/relationships" xmlns:p="http://schemas.openxmlformats.org/presentationml/2006/main">
   <p:cSld>
     <p:spTree>
@@ -4006,7 +4090,7 @@
                   <a:schemeClr val="bg1"/>
                 </a:solidFill>
               </a:rPr>
-              <a:t>Cluster Users Emulator [ Introduction ] </a:t>
+              <a:t>Cluster Users Emulator </a:t>
             </a:r>
             <a:endParaRPr lang="en-SG" sz="2400" dirty="0">
               <a:solidFill>
@@ -4067,7 +4151,7 @@
         <p:spPr>
           <a:xfrm>
             <a:off x="563125" y="731765"/>
-            <a:ext cx="10500110" cy="5386090"/>
+            <a:ext cx="10500110" cy="5878532"/>
           </a:xfrm>
           <a:prstGeom prst="rect">
             <a:avLst/>
@@ -4089,9 +4173,10 @@
             <a:endParaRPr lang="en-US" sz="1600" b="1" dirty="0"/>
           </a:p>
           <a:p>
+            <a:pPr algn="just"/>
             <a:r>
               <a:rPr lang="en-US" sz="1600" b="1" dirty="0"/>
-              <a:t>This product introduction slides will show what is Cluster User Emulator, who may be interested about using it, why user choose using this compare with other tools, technical details, the w</a:t>
+              <a:t>This product introduction slides will show what is Cluster User Emulator, who may be interested about using it, why user choose using it compared with using other tools with similar function, technical details, the w</a:t>
             </a:r>
             <a:r>
               <a:rPr lang="en-US" sz="1600" b="1" dirty="0">
@@ -4099,69 +4184,93 @@
                   <a:schemeClr val="tx1"/>
                 </a:solidFill>
               </a:rPr>
-              <a:t>eaknesses of our </a:t>
+              <a:t>eaknesses of the </a:t>
             </a:r>
             <a:r>
               <a:rPr lang="en-US" sz="1600" b="1" dirty="0"/>
-              <a:t>product and some product use case.</a:t>
-            </a:r>
-          </a:p>
-          <a:p>
+              <a:t>product and one product use case.</a:t>
+            </a:r>
+          </a:p>
+          <a:p>
+            <a:pPr algn="just"/>
             <a:endParaRPr lang="en-US" sz="1600" b="1" dirty="0"/>
           </a:p>
           <a:p>
+            <a:pPr algn="just"/>
             <a:r>
               <a:rPr lang="en-US" sz="1600" b="1" dirty="0"/>
               <a:t>Contents: </a:t>
             </a:r>
           </a:p>
           <a:p>
+            <a:pPr algn="just"/>
             <a:endParaRPr lang="en-US" sz="1600" b="1" dirty="0"/>
           </a:p>
           <a:p>
-            <a:pPr marL="285750" indent="-285750">
+            <a:pPr marL="285750" indent="-285750" algn="just">
               <a:buFont typeface="Arial" panose="020B0604020202020204" pitchFamily="34" charset="0"/>
               <a:buChar char="•"/>
             </a:pPr>
             <a:r>
               <a:rPr lang="en-US" sz="1600" b="1" dirty="0"/>
+              <a:t>Page [1] : </a:t>
+            </a:r>
+            <a:r>
+              <a:rPr lang="en-US" sz="1600" dirty="0"/>
+              <a:t>Document contents</a:t>
+            </a:r>
+          </a:p>
+          <a:p>
+            <a:pPr marL="285750" indent="-285750" algn="just">
+              <a:buFont typeface="Arial" panose="020B0604020202020204" pitchFamily="34" charset="0"/>
+              <a:buChar char="•"/>
+            </a:pPr>
+            <a:endParaRPr lang="en-US" sz="1600" b="1" dirty="0"/>
+          </a:p>
+          <a:p>
+            <a:pPr marL="285750" indent="-285750" algn="just">
+              <a:buFont typeface="Arial" panose="020B0604020202020204" pitchFamily="34" charset="0"/>
+              <a:buChar char="•"/>
+            </a:pPr>
+            <a:r>
+              <a:rPr lang="en-US" sz="1600" b="1" dirty="0"/>
               <a:t>Page [2, 3] </a:t>
             </a:r>
             <a:r>
               <a:rPr lang="en-US" sz="1600" dirty="0"/>
-              <a:t>: Product Introduction (What is Cluster User Emulator)</a:t>
-            </a:r>
-          </a:p>
-          <a:p>
-            <a:pPr marL="285750" indent="-285750">
+              <a:t>: Product introduction (What is Cluster Users Emulator).</a:t>
+            </a:r>
+          </a:p>
+          <a:p>
+            <a:pPr marL="285750" indent="-285750" algn="just">
               <a:buFont typeface="Arial" panose="020B0604020202020204" pitchFamily="34" charset="0"/>
               <a:buChar char="•"/>
             </a:pPr>
             <a:endParaRPr lang="en-US" sz="1600" dirty="0"/>
           </a:p>
           <a:p>
-            <a:pPr marL="285750" indent="-285750">
+            <a:pPr marL="285750" indent="-285750" algn="just">
               <a:buFont typeface="Arial" panose="020B0604020202020204" pitchFamily="34" charset="0"/>
               <a:buChar char="•"/>
             </a:pPr>
             <a:r>
               <a:rPr lang="en-US" sz="1600" b="1" dirty="0"/>
-              <a:t>Page [4,5] </a:t>
+              <a:t>Page [4, 5] </a:t>
             </a:r>
             <a:r>
               <a:rPr lang="en-US" sz="1600" dirty="0"/>
-              <a:t>: Product overview (who and why customer be interested about using cluster emulator)</a:t>
-            </a:r>
-          </a:p>
-          <a:p>
-            <a:pPr marL="285750" indent="-285750">
+              <a:t>: Product overview (Who and Why customers are interested about using it).</a:t>
+            </a:r>
+          </a:p>
+          <a:p>
+            <a:pPr marL="285750" indent="-285750" algn="just">
               <a:buFont typeface="Arial" panose="020B0604020202020204" pitchFamily="34" charset="0"/>
               <a:buChar char="•"/>
             </a:pPr>
             <a:endParaRPr lang="en-US" sz="1600" dirty="0"/>
           </a:p>
           <a:p>
-            <a:pPr marL="285750" indent="-285750">
+            <a:pPr marL="285750" indent="-285750" algn="just">
               <a:buFont typeface="Arial" panose="020B0604020202020204" pitchFamily="34" charset="0"/>
               <a:buChar char="•"/>
             </a:pPr>
@@ -4171,18 +4280,18 @@
             </a:r>
             <a:r>
               <a:rPr lang="en-US" sz="1600" dirty="0"/>
-              <a:t>: Technical detail of user action emulator. </a:t>
-            </a:r>
-          </a:p>
-          <a:p>
-            <a:pPr marL="285750" indent="-285750">
+              <a:t>: Technical detail (User action emulator system design). </a:t>
+            </a:r>
+          </a:p>
+          <a:p>
+            <a:pPr marL="285750" indent="-285750" algn="just">
               <a:buFont typeface="Arial" panose="020B0604020202020204" pitchFamily="34" charset="0"/>
               <a:buChar char="•"/>
             </a:pPr>
             <a:endParaRPr lang="en-US" sz="1600" dirty="0"/>
           </a:p>
           <a:p>
-            <a:pPr marL="285750" indent="-285750">
+            <a:pPr marL="285750" indent="-285750" algn="just">
               <a:buFont typeface="Arial" panose="020B0604020202020204" pitchFamily="34" charset="0"/>
               <a:buChar char="•"/>
             </a:pPr>
@@ -4192,18 +4301,18 @@
             </a:r>
             <a:r>
               <a:rPr lang="en-US" sz="1600" dirty="0"/>
-              <a:t>: Cluster User Emulator System workflow diagram. </a:t>
-            </a:r>
-          </a:p>
-          <a:p>
-            <a:pPr marL="285750" indent="-285750">
+              <a:t>: Technical detail (Cluster User Emulator System workflow diagram). </a:t>
+            </a:r>
+          </a:p>
+          <a:p>
+            <a:pPr marL="285750" indent="-285750" algn="just">
               <a:buFont typeface="Arial" panose="020B0604020202020204" pitchFamily="34" charset="0"/>
               <a:buChar char="•"/>
             </a:pPr>
             <a:endParaRPr lang="en-US" sz="1600" dirty="0"/>
           </a:p>
           <a:p>
-            <a:pPr marL="285750" indent="-285750">
+            <a:pPr marL="285750" indent="-285750" algn="just">
               <a:buFont typeface="Arial" panose="020B0604020202020204" pitchFamily="34" charset="0"/>
               <a:buChar char="•"/>
             </a:pPr>
@@ -4217,14 +4326,14 @@
             </a:r>
           </a:p>
           <a:p>
-            <a:pPr marL="285750" indent="-285750">
+            <a:pPr marL="285750" indent="-285750" algn="just">
               <a:buFont typeface="Arial" panose="020B0604020202020204" pitchFamily="34" charset="0"/>
               <a:buChar char="•"/>
             </a:pPr>
             <a:endParaRPr lang="en-US" sz="1600" dirty="0"/>
           </a:p>
           <a:p>
-            <a:pPr marL="285750" indent="-285750">
+            <a:pPr marL="285750" indent="-285750" algn="just">
               <a:buFont typeface="Arial" panose="020B0604020202020204" pitchFamily="34" charset="0"/>
               <a:buChar char="•"/>
             </a:pPr>
@@ -4234,18 +4343,18 @@
             </a:r>
             <a:r>
               <a:rPr lang="en-US" sz="1600" dirty="0"/>
-              <a:t>Technical detail (Introduction of monitor hub).</a:t>
-            </a:r>
-          </a:p>
-          <a:p>
-            <a:pPr marL="285750" indent="-285750">
+              <a:t>Technical detail (Introduction of Monitor hub).</a:t>
+            </a:r>
+          </a:p>
+          <a:p>
+            <a:pPr marL="285750" indent="-285750" algn="just">
               <a:buFont typeface="Arial" panose="020B0604020202020204" pitchFamily="34" charset="0"/>
               <a:buChar char="•"/>
             </a:pPr>
             <a:endParaRPr lang="en-US" sz="1600" dirty="0"/>
           </a:p>
           <a:p>
-            <a:pPr marL="285750" indent="-285750">
+            <a:pPr marL="285750" indent="-285750" algn="just">
               <a:buFont typeface="Arial" panose="020B0604020202020204" pitchFamily="34" charset="0"/>
               <a:buChar char="•"/>
             </a:pPr>
@@ -4269,9 +4378,6 @@
               <a:rPr lang="en-US" sz="1600" dirty="0"/>
               <a:t>)</a:t>
             </a:r>
-          </a:p>
-          <a:p>
-            <a:endParaRPr lang="en-US" sz="1600" b="1" dirty="0"/>
           </a:p>
         </p:txBody>
       </p:sp>
@@ -6712,7 +6818,7 @@
           <a:p>
             <a:r>
               <a:rPr lang="en-SG" sz="1600" dirty="0"/>
-              <a:t>The scheduler monitor hub program provide a website for the user to check each user emulator’s tasks execution state and do some basic control</a:t>
+              <a:t>The scheduler monitor hub program provide a website for the customer to check each user emulator’s tasks execution state and do some basic control</a:t>
             </a:r>
             <a:r>
               <a:rPr lang="en-SG" sz="1600" b="1" dirty="0"/>
@@ -6928,7 +7034,7 @@
             </a:pPr>
             <a:r>
               <a:rPr lang="en-SG" sz="1600" dirty="0"/>
-              <a:t>Tasks management function: task active/deactivate, add new task (under development ), change tasks time schedule(under development).</a:t>
+              <a:t>Tasks management function: task active/deactivate, add new task (under development), change tasks time schedule(under development).</a:t>
             </a:r>
           </a:p>
           <a:p>
@@ -6938,7 +7044,7 @@
             </a:pPr>
             <a:r>
               <a:rPr lang="en-SG" sz="1600" dirty="0"/>
-              <a:t>The user can plug heir own node with the monitor hub program in the cluster and start to monitor the scheduler they want to check without making any changes of the cluster.</a:t>
+              <a:t>The user can plug heir own laptop with the monitor hub program into the cluster and start to monitor the scheduler they are interested to check without making any changes of the cluster.</a:t>
             </a:r>
           </a:p>
         </p:txBody>
@@ -6997,7 +7103,7 @@
         </p:blipFill>
         <p:spPr>
           <a:xfrm>
-            <a:off x="579244" y="2851698"/>
+            <a:off x="579244" y="3052662"/>
             <a:ext cx="5652695" cy="3202066"/>
           </a:xfrm>
           <a:prstGeom prst="rect">
@@ -7025,7 +7131,7 @@
         </p:nvSpPr>
         <p:spPr>
           <a:xfrm>
-            <a:off x="327993" y="2027584"/>
+            <a:off x="327993" y="2228548"/>
             <a:ext cx="6200764" cy="4432851"/>
           </a:xfrm>
           <a:prstGeom prst="rect">
@@ -7168,7 +7274,7 @@
         </p:nvSpPr>
         <p:spPr>
           <a:xfrm>
-            <a:off x="327992" y="2027584"/>
+            <a:off x="327992" y="2228548"/>
             <a:ext cx="1510747" cy="338554"/>
           </a:xfrm>
           <a:prstGeom prst="rect">
@@ -7203,7 +7309,7 @@
         </p:nvSpPr>
         <p:spPr>
           <a:xfrm>
-            <a:off x="447594" y="2520738"/>
+            <a:off x="447594" y="2721702"/>
             <a:ext cx="2957997" cy="276999"/>
           </a:xfrm>
           <a:prstGeom prst="rect">
@@ -7246,7 +7352,7 @@
         </p:blipFill>
         <p:spPr>
           <a:xfrm>
-            <a:off x="3335903" y="5421141"/>
+            <a:off x="3335903" y="5622105"/>
             <a:ext cx="357810" cy="278297"/>
           </a:xfrm>
           <a:prstGeom prst="rect">
@@ -7281,7 +7387,7 @@
         </p:blipFill>
         <p:spPr>
           <a:xfrm>
-            <a:off x="4459128" y="5411202"/>
+            <a:off x="4459128" y="5612166"/>
             <a:ext cx="357810" cy="278297"/>
           </a:xfrm>
           <a:prstGeom prst="rect">
@@ -7316,7 +7422,7 @@
         </p:blipFill>
         <p:spPr>
           <a:xfrm>
-            <a:off x="5452829" y="4358310"/>
+            <a:off x="5452829" y="4559274"/>
             <a:ext cx="357810" cy="278297"/>
           </a:xfrm>
           <a:prstGeom prst="rect">
@@ -7351,7 +7457,7 @@
         </p:blipFill>
         <p:spPr>
           <a:xfrm>
-            <a:off x="5462768" y="2302003"/>
+            <a:off x="5462768" y="2502967"/>
             <a:ext cx="427130" cy="445361"/>
           </a:xfrm>
           <a:prstGeom prst="rect">
@@ -7380,7 +7486,7 @@
         </p:nvCxnSpPr>
         <p:spPr>
           <a:xfrm flipH="1">
-            <a:off x="3000043" y="5519693"/>
+            <a:off x="3000043" y="5720657"/>
             <a:ext cx="335860" cy="0"/>
           </a:xfrm>
           <a:prstGeom prst="straightConnector1">
@@ -7425,7 +7531,7 @@
         </p:nvCxnSpPr>
         <p:spPr>
           <a:xfrm flipH="1">
-            <a:off x="4123268" y="5519693"/>
+            <a:off x="4123268" y="5720657"/>
             <a:ext cx="335860" cy="0"/>
           </a:xfrm>
           <a:prstGeom prst="straightConnector1">
@@ -7470,7 +7576,7 @@
         </p:nvCxnSpPr>
         <p:spPr>
           <a:xfrm flipH="1">
-            <a:off x="5158408" y="4459519"/>
+            <a:off x="5158408" y="4660483"/>
             <a:ext cx="294421" cy="0"/>
           </a:xfrm>
           <a:prstGeom prst="straightConnector1">
@@ -7513,7 +7619,7 @@
         </p:nvSpPr>
         <p:spPr>
           <a:xfrm>
-            <a:off x="5251039" y="2090631"/>
+            <a:off x="5251039" y="2291595"/>
             <a:ext cx="1277717" cy="230832"/>
           </a:xfrm>
           <a:prstGeom prst="rect">
@@ -7557,7 +7663,7 @@
         </p:nvSpPr>
         <p:spPr>
           <a:xfrm>
-            <a:off x="2637998" y="5206962"/>
+            <a:off x="2637998" y="5407926"/>
             <a:ext cx="1220524" cy="230832"/>
           </a:xfrm>
           <a:prstGeom prst="rect">
@@ -7609,7 +7715,7 @@
         </p:nvSpPr>
         <p:spPr>
           <a:xfrm>
-            <a:off x="4077644" y="5199134"/>
+            <a:off x="4077644" y="5400098"/>
             <a:ext cx="1220524" cy="230832"/>
           </a:xfrm>
           <a:prstGeom prst="rect">
@@ -7661,7 +7767,7 @@
         </p:nvSpPr>
         <p:spPr>
           <a:xfrm>
-            <a:off x="5200377" y="4128593"/>
+            <a:off x="5200377" y="4329557"/>
             <a:ext cx="1737136" cy="230832"/>
           </a:xfrm>
           <a:prstGeom prst="rect">
@@ -7728,7 +7834,7 @@
         </p:blipFill>
         <p:spPr bwMode="auto">
           <a:xfrm>
-            <a:off x="6673418" y="2256238"/>
+            <a:off x="6673418" y="2457202"/>
             <a:ext cx="528189" cy="528189"/>
           </a:xfrm>
           <a:prstGeom prst="rect">
@@ -7763,7 +7869,7 @@
         </p:nvCxnSpPr>
         <p:spPr>
           <a:xfrm rot="10800000" flipV="1">
-            <a:off x="3693714" y="2524683"/>
+            <a:off x="3693714" y="2725647"/>
             <a:ext cx="1769054" cy="1790955"/>
           </a:xfrm>
           <a:prstGeom prst="bentConnector2">
@@ -7810,7 +7916,7 @@
         </p:nvCxnSpPr>
         <p:spPr>
           <a:xfrm flipH="1">
-            <a:off x="3053399" y="4753281"/>
+            <a:off x="3053399" y="4954245"/>
             <a:ext cx="352192" cy="118911"/>
           </a:xfrm>
           <a:prstGeom prst="straightConnector1">
@@ -7857,7 +7963,7 @@
         </p:nvCxnSpPr>
         <p:spPr>
           <a:xfrm>
-            <a:off x="3745548" y="4636607"/>
+            <a:off x="3745548" y="4837571"/>
             <a:ext cx="627669" cy="235585"/>
           </a:xfrm>
           <a:prstGeom prst="straightConnector1">
@@ -7904,7 +8010,7 @@
         </p:nvCxnSpPr>
         <p:spPr>
           <a:xfrm flipV="1">
-            <a:off x="3804712" y="4128593"/>
+            <a:off x="3804712" y="4329557"/>
             <a:ext cx="968535" cy="420617"/>
           </a:xfrm>
           <a:prstGeom prst="straightConnector1">
@@ -7949,7 +8055,7 @@
         </p:nvCxnSpPr>
         <p:spPr>
           <a:xfrm rot="16200000" flipH="1">
-            <a:off x="3044917" y="5027743"/>
+            <a:off x="3044917" y="5228707"/>
             <a:ext cx="391941" cy="374976"/>
           </a:xfrm>
           <a:prstGeom prst="bentConnector3">
@@ -7998,7 +8104,7 @@
         </p:nvCxnSpPr>
         <p:spPr>
           <a:xfrm rot="16200000" flipH="1">
-            <a:off x="4267535" y="5040704"/>
+            <a:off x="4267535" y="5241668"/>
             <a:ext cx="391942" cy="349054"/>
           </a:xfrm>
           <a:prstGeom prst="bentConnector3">
@@ -8045,7 +8151,7 @@
         </p:nvCxnSpPr>
         <p:spPr>
           <a:xfrm rot="16200000" flipH="1">
-            <a:off x="5284850" y="3988927"/>
+            <a:off x="5284850" y="4189891"/>
             <a:ext cx="391942" cy="349054"/>
           </a:xfrm>
           <a:prstGeom prst="bentConnector3">
@@ -8096,7 +8202,7 @@
         </p:nvCxnSpPr>
         <p:spPr>
           <a:xfrm flipH="1">
-            <a:off x="5889898" y="2520333"/>
+            <a:off x="5889898" y="2721297"/>
             <a:ext cx="783520" cy="4351"/>
           </a:xfrm>
           <a:prstGeom prst="straightConnector1">
@@ -8141,8 +8247,8 @@
         </p:nvSpPr>
         <p:spPr>
           <a:xfrm>
-            <a:off x="252875" y="660722"/>
-            <a:ext cx="11611132" cy="1415772"/>
+            <a:off x="252875" y="570363"/>
+            <a:ext cx="11611132" cy="1661993"/>
           </a:xfrm>
           <a:prstGeom prst="rect">
             <a:avLst/>
@@ -8161,6 +8267,9 @@
             </a:r>
           </a:p>
           <a:p>
+            <a:endParaRPr lang="en-SG" sz="1600" b="1" dirty="0"/>
+          </a:p>
+          <a:p>
             <a:pPr algn="just"/>
             <a:r>
               <a:rPr lang="en-SG" sz="1400" dirty="0"/>
@@ -8172,7 +8281,7 @@
             </a:r>
             <a:r>
               <a:rPr lang="en-SG" sz="1400" dirty="0"/>
-              <a:t> 2023, we used VirtualBox to create serval VM based functional servers and a mini software define network environment to simulate a normal company network. We want to simulate 3 Windows users’ daily office work action and do some attack on one of the user’s windows machine with malware. Then we want to analysis different logs to parse the malware’s action from all the users’ normal action and benign traffic data. Cluster User Emulator is used to simulate 2 types of users action: normal users and the network admin user in the system. (The system config diagram is shown below)</a:t>
+              <a:t> 2023, we used VirtualBox to create serval VM based functional servers and a mini software define network environment to simulate a normal company network. We want to simulate 3 Windows users’ daily office work action and do some attack on one of the user’s windows machine with malware. Then we want to analysis different logs to parse the malware’s action from all the users’ normal action and benign traffic data. Cluster Users Emulator is used to simulate 2 types of users action: normal users and the network admin user in the system. (The system config diagram is shown below)</a:t>
             </a:r>
           </a:p>
           <a:p>
@@ -8194,8 +8303,8 @@
         </p:nvSpPr>
         <p:spPr>
           <a:xfrm>
-            <a:off x="7271153" y="1899592"/>
-            <a:ext cx="4763003" cy="4832092"/>
+            <a:off x="7240174" y="2056093"/>
+            <a:ext cx="4763003" cy="4616648"/>
           </a:xfrm>
           <a:prstGeom prst="rect">
             <a:avLst/>
@@ -8295,10 +8404,6 @@
           </a:p>
           <a:p>
             <a:pPr algn="just"/>
-            <a:endParaRPr lang="en-SG" sz="1400" dirty="0"/>
-          </a:p>
-          <a:p>
-            <a:pPr algn="just"/>
             <a:r>
               <a:rPr lang="en-SG" sz="1400" dirty="0"/>
               <a:t>All the actions will be repeat every day with the same time line config.</a:t>
@@ -8322,7 +8427,7 @@
         </p:nvCxnSpPr>
         <p:spPr>
           <a:xfrm>
-            <a:off x="638138" y="6259627"/>
+            <a:off x="638138" y="6460591"/>
             <a:ext cx="265325" cy="0"/>
           </a:xfrm>
           <a:prstGeom prst="straightConnector1">
@@ -8367,7 +8472,7 @@
         </p:nvSpPr>
         <p:spPr>
           <a:xfrm>
-            <a:off x="872184" y="6158098"/>
+            <a:off x="872184" y="6359062"/>
             <a:ext cx="1505636" cy="230832"/>
           </a:xfrm>
           <a:prstGeom prst="rect">
@@ -8419,7 +8524,7 @@
         </p:blipFill>
         <p:spPr>
           <a:xfrm>
-            <a:off x="2697584" y="6179850"/>
+            <a:off x="2697584" y="6380814"/>
             <a:ext cx="269885" cy="209911"/>
           </a:xfrm>
           <a:prstGeom prst="rect">
@@ -8446,7 +8551,7 @@
         </p:nvSpPr>
         <p:spPr>
           <a:xfrm>
-            <a:off x="2922011" y="6179282"/>
+            <a:off x="2922011" y="6380246"/>
             <a:ext cx="1277717" cy="230832"/>
           </a:xfrm>
           <a:prstGeom prst="rect">
@@ -8637,7 +8742,7 @@
             <a:pPr algn="just"/>
             <a:r>
               <a:rPr lang="en-US" sz="1600" dirty="0"/>
-              <a:t>The Cluster Users Emulator is a multiple users’ action emulation system running in a network/compute cluster system which can fill the customers’ requirement about:</a:t>
+              <a:t>The Cluster Users Emulator is a multiple users’ action emulation system running in a network/compute cluster system which can satisfy the customers’ requirement about:</a:t>
             </a:r>
           </a:p>
           <a:p>
@@ -8651,7 +8756,7 @@
             </a:pPr>
             <a:r>
               <a:rPr lang="en-US" sz="1600" dirty="0"/>
-              <a:t>Network-traffic / node activities generation. </a:t>
+              <a:t>Network-traffic / node activities / group-users interactive action generation. </a:t>
             </a:r>
           </a:p>
           <a:p>
@@ -8697,7 +8802,7 @@
             <a:pPr algn="just"/>
             <a:r>
               <a:rPr lang="en-US" sz="1600" dirty="0"/>
-              <a:t>We want to create a distributed and no-centralized single/multiple users’ activities emulator system to simulate and monitor a mid side cluster of users’ normal network traffic actions and the local activities events. The system can be applied to support below scenario : </a:t>
+              <a:t>We want to create a distributed and no-centralized single/multiple users’ activities emulator system to simulate and monitor a mid size cluster of users’ normal network traffic actions and the local activities events. The system can be applied to support below scenario : </a:t>
             </a:r>
           </a:p>
           <a:p>
@@ -8998,7 +9103,7 @@
             </a:r>
             <a:r>
               <a:rPr lang="en-US" sz="1600" dirty="0"/>
-              <a:t>: A RPA type scheduler to invoke the action in repository to build more complex “Human type” activities and run the tasks based on the users’ timeline playbook configuration.</a:t>
+              <a:t>: A RPA type scheduler to invoke the lib from action repository to build more complex “Human type” activities and run the tasks based on the users’ timeline playbook configuration.</a:t>
             </a:r>
           </a:p>
           <a:p>
@@ -9012,7 +9117,7 @@
             </a:r>
             <a:r>
               <a:rPr lang="en-US" sz="1600" dirty="0"/>
-              <a:t>: A no-centralized monitor website host which provides plug and play tasks state view function for customer to monitor and control all/parts of their  schedulers in a computers/servers cluster. </a:t>
+              <a:t>: A no-centralized monitor website host which provides plug and play tasks state view function for the customer to monitor and control all/parts of their  schedulers in a computers/servers cluster. </a:t>
             </a:r>
           </a:p>
         </p:txBody>
@@ -9217,7 +9322,7 @@
             <a:pPr algn="just"/>
             <a:r>
               <a:rPr lang="en-US" sz="1600" dirty="0"/>
-              <a:t>There are several kinds of well-developed network traffic generators, task scheduler tools and the tasks progress monitors hub in the market. But most of these tools’ functions are very general and don’t cover all the three areas (monitor, management and simulate), so the customer still needs to build their system and do lots of development work. Our Cluster Users Emulator is aimed to provide a packaged all-in-one light solution allow our customer to simulate a groups of different users’ complex human type action, then schedule these event and monitor/control the task without spend much workload to play with several different tools. </a:t>
+              <a:t>There are several kinds of well-developed network traffic generators, task scheduler tools and the tasks progress monitors hub in the market. But most of these tools’ functions are very general and don’t cover all the three areas ( emulation, management and monitoring), so the customer still speed a lot of time and effort to build their system. Our Cluster Users Emulator is aimed to provide a packaged all-in-one light solution allow our customers to simulate a groups of different users’ complex human type action, then schedule these events and monitor / control them without spending much workload to play with several different tools. </a:t>
             </a:r>
           </a:p>
         </p:txBody>
@@ -9237,14 +9342,14 @@
           <p:nvPr>
             <p:extLst>
               <p:ext uri="{D42A27DB-BD31-4B8C-83A1-F6EECF244321}">
-                <p14:modId xmlns:p14="http://schemas.microsoft.com/office/powerpoint/2010/main" val="1096614984"/>
+                <p14:modId xmlns:p14="http://schemas.microsoft.com/office/powerpoint/2010/main" val="4241941187"/>
               </p:ext>
             </p:extLst>
           </p:nvPr>
         </p:nvGraphicFramePr>
         <p:xfrm>
-          <a:off x="489818" y="2995899"/>
-          <a:ext cx="9777303" cy="3765234"/>
+          <a:off x="469721" y="3196866"/>
+          <a:ext cx="9267131" cy="3546921"/>
         </p:xfrm>
         <a:graphic>
           <a:graphicData uri="http://schemas.openxmlformats.org/drawingml/2006/table">
@@ -9253,14 +9358,14 @@
                 <a:tableStyleId>{5C22544A-7EE6-4342-B048-85BDC9FD1C3A}</a:tableStyleId>
               </a:tblPr>
               <a:tblGrid>
-                <a:gridCol w="4694455">
+                <a:gridCol w="4449502">
                   <a:extLst>
                     <a:ext uri="{9D8B030D-6E8A-4147-A177-3AD203B41FA5}">
                       <a16:colId xmlns:a16="http://schemas.microsoft.com/office/drawing/2014/main" val="4149870345"/>
                     </a:ext>
                   </a:extLst>
                 </a:gridCol>
-                <a:gridCol w="5082848">
+                <a:gridCol w="4817629">
                   <a:extLst>
                     <a:ext uri="{9D8B030D-6E8A-4147-A177-3AD203B41FA5}">
                       <a16:colId xmlns:a16="http://schemas.microsoft.com/office/drawing/2014/main" val="3730207817"/>
@@ -9268,7 +9373,7 @@
                   </a:extLst>
                 </a:gridCol>
               </a:tblGrid>
-              <a:tr h="2027874">
+              <a:tr h="1809561">
                 <a:tc>
                   <a:txBody>
                     <a:bodyPr/>
@@ -9282,13 +9387,6 @@
                         </a:rPr>
                         <a:t>Strengths </a:t>
                       </a:r>
-                    </a:p>
-                    <a:p>
-                      <a:endParaRPr lang="en-US" sz="1200" dirty="0">
-                        <a:solidFill>
-                          <a:schemeClr val="tx1"/>
-                        </a:solidFill>
-                      </a:endParaRPr>
                     </a:p>
                     <a:p>
                       <a:pPr marL="285750" indent="-285750">
@@ -9315,7 +9413,7 @@
                             <a:schemeClr val="tx1"/>
                           </a:solidFill>
                         </a:rPr>
-                        <a:t>Opensource with fully customized feature redesign flexibility and free.</a:t>
+                        <a:t>Opensource with fully customized feature,  re-design flexibility and free integration.</a:t>
                       </a:r>
                     </a:p>
                     <a:p>
@@ -9343,7 +9441,7 @@
                             <a:schemeClr val="tx1"/>
                           </a:solidFill>
                         </a:rPr>
-                        <a:t>Windows planform and UI operation action lib. </a:t>
+                        <a:t>Provide Windows planform and UI operation action lib. </a:t>
                       </a:r>
                     </a:p>
                     <a:p>
@@ -9436,25 +9534,6 @@
                         </a:rPr>
                         <a:t>Weaknesses </a:t>
                       </a:r>
-                    </a:p>
-                    <a:p>
-                      <a:pPr marL="0" marR="0" lvl="0" indent="0" algn="l" defTabSz="914400" rtl="0" eaLnBrk="1" fontAlgn="auto" latinLnBrk="0" hangingPunct="1">
-                        <a:lnSpc>
-                          <a:spcPct val="100000"/>
-                        </a:lnSpc>
-                        <a:spcBef>
-                          <a:spcPts val="0"/>
-                        </a:spcBef>
-                        <a:spcAft>
-                          <a:spcPts val="0"/>
-                        </a:spcAft>
-                        <a:buClrTx/>
-                        <a:buSzTx/>
-                        <a:buFontTx/>
-                        <a:buNone/>
-                        <a:tabLst/>
-                        <a:defRPr/>
-                      </a:pPr>
                       <a:endParaRPr lang="en-SG" sz="1200" dirty="0">
                         <a:solidFill>
                           <a:schemeClr val="tx1"/>
@@ -9614,11 +9693,14 @@
                         <a:tabLst/>
                         <a:defRPr/>
                       </a:pPr>
-                      <a:endParaRPr lang="en-SG" sz="1200" b="0" dirty="0">
-                        <a:solidFill>
-                          <a:schemeClr val="tx1"/>
-                        </a:solidFill>
-                      </a:endParaRPr>
+                      <a:r>
+                        <a:rPr lang="en-SG" sz="1200" b="0" dirty="0">
+                          <a:solidFill>
+                            <a:schemeClr val="tx1"/>
+                          </a:solidFill>
+                        </a:rPr>
+                        <a:t>Not much use case to convince customer. </a:t>
+                      </a:r>
                     </a:p>
                   </a:txBody>
                   <a:tcPr>
@@ -9672,7 +9754,7 @@
                   </a:ext>
                 </a:extLst>
               </a:tr>
-              <a:tr h="1675201">
+              <a:tr h="1494856">
                 <a:tc>
                   <a:txBody>
                     <a:bodyPr/>
@@ -9682,9 +9764,6 @@
                         <a:rPr lang="en-SG" sz="1200" b="1" dirty="0"/>
                         <a:t>Opportunities</a:t>
                       </a:r>
-                    </a:p>
-                    <a:p>
-                      <a:endParaRPr lang="en-SG" sz="1200" b="1" dirty="0"/>
                     </a:p>
                     <a:p>
                       <a:pPr marL="285750" indent="-285750">
@@ -9723,7 +9802,7 @@
                       </a:pPr>
                       <a:r>
                         <a:rPr lang="en-SG" sz="1200" b="0" dirty="0"/>
-                        <a:t>Can also used to simulate different teams’ attack and defence action in cyber exercise . </a:t>
+                        <a:t>Can used to simulate different teams’ attack and defence action in cyber exercise . </a:t>
                       </a:r>
                     </a:p>
                   </a:txBody>
@@ -9781,9 +9860,6 @@
                         <a:rPr lang="en-SG" sz="1200" b="1" dirty="0"/>
                         <a:t>Threats</a:t>
                       </a:r>
-                    </a:p>
-                    <a:p>
-                      <a:endParaRPr lang="en-SG" sz="1200" b="1" dirty="0"/>
                     </a:p>
                     <a:p>
                       <a:r>
@@ -9891,7 +9967,7 @@
         </p:nvSpPr>
         <p:spPr>
           <a:xfrm>
-            <a:off x="370549" y="2691138"/>
+            <a:off x="370549" y="2774725"/>
             <a:ext cx="3599930" cy="338554"/>
           </a:xfrm>
           <a:prstGeom prst="rect">
@@ -10011,7 +10087,7 @@
           <p:nvPr/>
         </p:nvPicPr>
         <p:blipFill>
-          <a:blip r:embed="rId2">
+          <a:blip r:embed="rId3">
             <a:extLst>
               <a:ext uri="{28A0092B-C50C-407E-A947-70E740481C1C}">
                 <a14:useLocalDpi xmlns:a14="http://schemas.microsoft.com/office/drawing/2010/main" val="0"/>
@@ -10047,7 +10123,7 @@
         <p:spPr>
           <a:xfrm>
             <a:off x="495933" y="660041"/>
-            <a:ext cx="10507012" cy="5509200"/>
+            <a:ext cx="10507012" cy="5539978"/>
           </a:xfrm>
           <a:prstGeom prst="rect">
             <a:avLst/>
@@ -10077,7 +10153,7 @@
             </a:pPr>
             <a:r>
               <a:rPr lang="en-US" sz="1600" dirty="0"/>
-              <a:t>Customer whose system config and requirements are keep updating and need flexible tool to integrate different apps. </a:t>
+              <a:t>Customers whose system config setting and requirements keep updating, or need flexible tool to integrate different apps. </a:t>
             </a:r>
           </a:p>
           <a:p>
@@ -10111,7 +10187,7 @@
             </a:pPr>
             <a:r>
               <a:rPr lang="en-US" sz="1600" dirty="0"/>
-              <a:t>Customer who needs different kinds of pre-configured activities scenario and try to avoid spending much development effort on the event /traffic generation details. </a:t>
+              <a:t>Customer who needs different kinds of pre-configured activities scenario and try to avoid spending much development effort on the events/traffic generation details. </a:t>
             </a:r>
           </a:p>
           <a:p>
@@ -10151,32 +10227,59 @@
             <a:endParaRPr lang="en-US" sz="1600" b="1" dirty="0"/>
           </a:p>
           <a:p>
-            <a:pPr algn="just"/>
+            <a:pPr marL="285750" indent="-285750" algn="just">
+              <a:buFont typeface="Arial" panose="020B0604020202020204" pitchFamily="34" charset="0"/>
+              <a:buChar char="•"/>
+            </a:pPr>
+            <a:r>
+              <a:rPr lang="en-US" sz="1600" b="1" dirty="0"/>
+              <a:t>Open</a:t>
+            </a:r>
             <a:r>
               <a:rPr lang="en-US" sz="1600" dirty="0"/>
-              <a:t>Open: Our product is open source and focuses on more specific activities generation tasks, so compare with other general tools, our product is more suitable for the customer to create complex scenario. </a:t>
-            </a:r>
-          </a:p>
-          <a:p>
-            <a:pPr algn="just"/>
+              <a:t> : Our product is open source and focuses on more specific activities generation tasks, so compare with other general tools, our product is more suitable for the customer to create complex scenario. </a:t>
+            </a:r>
+          </a:p>
+          <a:p>
+            <a:pPr marL="285750" indent="-285750" algn="just">
+              <a:buFont typeface="Arial" panose="020B0604020202020204" pitchFamily="34" charset="0"/>
+              <a:buChar char="•"/>
+            </a:pPr>
             <a:endParaRPr lang="en-US" sz="1600" dirty="0"/>
           </a:p>
           <a:p>
-            <a:pPr algn="just"/>
+            <a:pPr marL="285750" indent="-285750" algn="just">
+              <a:buFont typeface="Arial" panose="020B0604020202020204" pitchFamily="34" charset="0"/>
+              <a:buChar char="•"/>
+            </a:pPr>
+            <a:r>
+              <a:rPr lang="en-US" sz="1600" b="1" dirty="0"/>
+              <a:t>Reusable</a:t>
+            </a:r>
             <a:r>
               <a:rPr lang="en-US" sz="1600" dirty="0"/>
-              <a:t>Reusable: Our product can provide activities lab for user to reuse and integrate their software/program. </a:t>
-            </a:r>
-          </a:p>
-          <a:p>
-            <a:pPr algn="just"/>
+              <a:t>: Our product can provide activities library for customer to reuse and integrate to their software/program. </a:t>
+            </a:r>
+          </a:p>
+          <a:p>
+            <a:pPr marL="285750" indent="-285750" algn="just">
+              <a:buFont typeface="Arial" panose="020B0604020202020204" pitchFamily="34" charset="0"/>
+              <a:buChar char="•"/>
+            </a:pPr>
             <a:endParaRPr lang="en-US" sz="1600" dirty="0"/>
           </a:p>
           <a:p>
-            <a:pPr algn="just"/>
+            <a:pPr marL="285750" indent="-285750" algn="just">
+              <a:buFont typeface="Arial" panose="020B0604020202020204" pitchFamily="34" charset="0"/>
+              <a:buChar char="•"/>
+            </a:pPr>
+            <a:r>
+              <a:rPr lang="en-US" sz="1600" b="1" dirty="0"/>
+              <a:t>Flexible</a:t>
+            </a:r>
             <a:r>
               <a:rPr lang="en-US" sz="1600" dirty="0"/>
-              <a:t>Flexible: Our pre-build user cluster’s activities scenario can be easily changed to match customers’ requirement to help reduce the customer’s development effort. </a:t>
+              <a:t>: Our pre-build user cluster’s activities scenario can be easily changed to match customers’ requirement to help reduce the customer’s development effort. </a:t>
             </a:r>
           </a:p>
           <a:p>
@@ -10233,7 +10336,7 @@
             </a:pPr>
             <a:r>
               <a:rPr lang="en-US" sz="1400" dirty="0">
-                <a:hlinkClick r:id="rId3"/>
+                <a:hlinkClick r:id="rId4"/>
               </a:rPr>
               <a:t>https://www.youtube.com/watch?v=jgm3gQhzUq4&amp;t=57s</a:t>
             </a:r>
@@ -10246,7 +10349,7 @@
             </a:pPr>
             <a:r>
               <a:rPr lang="en-US" sz="1400" dirty="0">
-                <a:hlinkClick r:id="rId4"/>
+                <a:hlinkClick r:id="rId5"/>
               </a:rPr>
               <a:t>https://www.youtube.com/watch?v=wZsRmYPcPTQ</a:t>
             </a:r>

</xml_diff>